<commit_message>
Design Template for PowerPoint
Supposed to resemble mountains in a graphic 3D context
</commit_message>
<xml_diff>
--- a/Demo Presentation/Demo Presentation.pptx
+++ b/Demo Presentation/Demo Presentation.pptx
@@ -3097,42 +3097,4753 @@
       </p:grpSpPr>
       <p:sp>
         <p:nvSpPr>
-          <p:cNvPr id="2" name="Title 1"/>
-          <p:cNvSpPr>
-            <a:spLocks noGrp="1"/>
-          </p:cNvSpPr>
-          <p:nvPr>
-            <p:ph type="ctrTitle"/>
-          </p:nvPr>
+          <p:cNvPr id="215" name="Rectangle 214"/>
+          <p:cNvSpPr/>
+          <p:nvPr/>
         </p:nvSpPr>
-        <p:spPr/>
+        <p:spPr>
+          <a:xfrm>
+            <a:off x="0" y="-911"/>
+            <a:ext cx="9157655" cy="6845256"/>
+          </a:xfrm>
+          <a:prstGeom prst="rect">
+            <a:avLst/>
+          </a:prstGeom>
+          <a:solidFill>
+            <a:schemeClr val="accent1">
+              <a:lumMod val="40000"/>
+              <a:lumOff val="60000"/>
+            </a:schemeClr>
+          </a:solidFill>
+          <a:ln>
+            <a:noFill/>
+          </a:ln>
+          <a:effectLst/>
+        </p:spPr>
+        <p:style>
+          <a:lnRef idx="1">
+            <a:schemeClr val="accent1"/>
+          </a:lnRef>
+          <a:fillRef idx="3">
+            <a:schemeClr val="accent1"/>
+          </a:fillRef>
+          <a:effectRef idx="2">
+            <a:schemeClr val="accent1"/>
+          </a:effectRef>
+          <a:fontRef idx="minor">
+            <a:schemeClr val="lt1"/>
+          </a:fontRef>
+        </p:style>
         <p:txBody>
-          <a:bodyPr/>
+          <a:bodyPr rtlCol="0" anchor="ctr"/>
           <a:lstStyle/>
           <a:p>
+            <a:pPr algn="ctr"/>
             <a:endParaRPr lang="en-US"/>
           </a:p>
         </p:txBody>
       </p:sp>
-      <p:sp>
-        <p:nvSpPr>
-          <p:cNvPr id="3" name="Subtitle 2"/>
-          <p:cNvSpPr>
-            <a:spLocks noGrp="1"/>
-          </p:cNvSpPr>
-          <p:nvPr>
-            <p:ph type="subTitle" idx="1"/>
-          </p:nvPr>
-        </p:nvSpPr>
-        <p:spPr/>
-        <p:txBody>
-          <a:bodyPr/>
-          <a:lstStyle/>
-          <a:p>
-            <a:endParaRPr lang="en-US"/>
-          </a:p>
-        </p:txBody>
-      </p:sp>
+      <p:grpSp>
+        <p:nvGrpSpPr>
+          <p:cNvPr id="214" name="Group 213"/>
+          <p:cNvGrpSpPr/>
+          <p:nvPr/>
+        </p:nvGrpSpPr>
+        <p:grpSpPr>
+          <a:xfrm>
+            <a:off x="147304" y="175544"/>
+            <a:ext cx="9131679" cy="6606814"/>
+            <a:chOff x="147304" y="175544"/>
+            <a:chExt cx="9131679" cy="6606814"/>
+          </a:xfrm>
+        </p:grpSpPr>
+        <p:sp>
+          <p:nvSpPr>
+            <p:cNvPr id="18" name="Right Triangle 17"/>
+            <p:cNvSpPr/>
+            <p:nvPr/>
+          </p:nvSpPr>
+          <p:spPr>
+            <a:xfrm rot="1440107">
+              <a:off x="212852" y="5836839"/>
+              <a:ext cx="800180" cy="811575"/>
+            </a:xfrm>
+            <a:prstGeom prst="rtTriangle">
+              <a:avLst/>
+            </a:prstGeom>
+            <a:solidFill>
+              <a:schemeClr val="tx2">
+                <a:lumMod val="50000"/>
+              </a:schemeClr>
+            </a:solidFill>
+            <a:ln>
+              <a:noFill/>
+            </a:ln>
+            <a:effectLst/>
+          </p:spPr>
+          <p:style>
+            <a:lnRef idx="1">
+              <a:schemeClr val="accent1"/>
+            </a:lnRef>
+            <a:fillRef idx="3">
+              <a:schemeClr val="accent1"/>
+            </a:fillRef>
+            <a:effectRef idx="2">
+              <a:schemeClr val="accent1"/>
+            </a:effectRef>
+            <a:fontRef idx="minor">
+              <a:schemeClr val="lt1"/>
+            </a:fontRef>
+          </p:style>
+          <p:txBody>
+            <a:bodyPr rtlCol="0" anchor="ctr"/>
+            <a:lstStyle/>
+            <a:p>
+              <a:pPr algn="ctr"/>
+              <a:endParaRPr lang="en-US"/>
+            </a:p>
+          </p:txBody>
+        </p:sp>
+        <p:sp>
+          <p:nvSpPr>
+            <p:cNvPr id="19" name="Isosceles Triangle 18"/>
+            <p:cNvSpPr/>
+            <p:nvPr/>
+          </p:nvSpPr>
+          <p:spPr>
+            <a:xfrm rot="1945215">
+              <a:off x="199545" y="5108443"/>
+              <a:ext cx="1044222" cy="740633"/>
+            </a:xfrm>
+            <a:prstGeom prst="triangle">
+              <a:avLst/>
+            </a:prstGeom>
+            <a:solidFill>
+              <a:schemeClr val="tx2">
+                <a:lumMod val="75000"/>
+              </a:schemeClr>
+            </a:solidFill>
+            <a:ln>
+              <a:noFill/>
+            </a:ln>
+            <a:effectLst/>
+          </p:spPr>
+          <p:style>
+            <a:lnRef idx="1">
+              <a:schemeClr val="accent1"/>
+            </a:lnRef>
+            <a:fillRef idx="3">
+              <a:schemeClr val="accent1"/>
+            </a:fillRef>
+            <a:effectRef idx="2">
+              <a:schemeClr val="accent1"/>
+            </a:effectRef>
+            <a:fontRef idx="minor">
+              <a:schemeClr val="lt1"/>
+            </a:fontRef>
+          </p:style>
+          <p:txBody>
+            <a:bodyPr rtlCol="0" anchor="ctr"/>
+            <a:lstStyle/>
+            <a:p>
+              <a:pPr algn="ctr"/>
+              <a:endParaRPr lang="en-US"/>
+            </a:p>
+          </p:txBody>
+        </p:sp>
+        <p:sp>
+          <p:nvSpPr>
+            <p:cNvPr id="23" name="Isosceles Triangle 22"/>
+            <p:cNvSpPr/>
+            <p:nvPr/>
+          </p:nvSpPr>
+          <p:spPr>
+            <a:xfrm rot="3867000">
+              <a:off x="354396" y="4454716"/>
+              <a:ext cx="585363" cy="971967"/>
+            </a:xfrm>
+            <a:prstGeom prst="triangle">
+              <a:avLst/>
+            </a:prstGeom>
+            <a:solidFill>
+              <a:schemeClr val="tx2">
+                <a:lumMod val="60000"/>
+                <a:lumOff val="40000"/>
+              </a:schemeClr>
+            </a:solidFill>
+            <a:ln>
+              <a:noFill/>
+            </a:ln>
+            <a:effectLst/>
+          </p:spPr>
+          <p:style>
+            <a:lnRef idx="1">
+              <a:schemeClr val="accent1"/>
+            </a:lnRef>
+            <a:fillRef idx="3">
+              <a:schemeClr val="accent1"/>
+            </a:fillRef>
+            <a:effectRef idx="2">
+              <a:schemeClr val="accent1"/>
+            </a:effectRef>
+            <a:fontRef idx="minor">
+              <a:schemeClr val="lt1"/>
+            </a:fontRef>
+          </p:style>
+          <p:txBody>
+            <a:bodyPr rtlCol="0" anchor="ctr"/>
+            <a:lstStyle/>
+            <a:p>
+              <a:pPr algn="ctr"/>
+              <a:endParaRPr lang="en-US"/>
+            </a:p>
+          </p:txBody>
+        </p:sp>
+        <p:sp>
+          <p:nvSpPr>
+            <p:cNvPr id="24" name="Right Triangle 23"/>
+            <p:cNvSpPr/>
+            <p:nvPr/>
+          </p:nvSpPr>
+          <p:spPr>
+            <a:xfrm rot="20725757" flipH="1">
+              <a:off x="586881" y="5391217"/>
+              <a:ext cx="938424" cy="1073302"/>
+            </a:xfrm>
+            <a:prstGeom prst="rtTriangle">
+              <a:avLst/>
+            </a:prstGeom>
+            <a:solidFill>
+              <a:schemeClr val="accent1">
+                <a:lumMod val="75000"/>
+              </a:schemeClr>
+            </a:solidFill>
+            <a:ln>
+              <a:noFill/>
+            </a:ln>
+            <a:effectLst/>
+          </p:spPr>
+          <p:style>
+            <a:lnRef idx="1">
+              <a:schemeClr val="accent1"/>
+            </a:lnRef>
+            <a:fillRef idx="3">
+              <a:schemeClr val="accent1"/>
+            </a:fillRef>
+            <a:effectRef idx="2">
+              <a:schemeClr val="accent1"/>
+            </a:effectRef>
+            <a:fontRef idx="minor">
+              <a:schemeClr val="lt1"/>
+            </a:fontRef>
+          </p:style>
+          <p:txBody>
+            <a:bodyPr rtlCol="0" anchor="ctr"/>
+            <a:lstStyle/>
+            <a:p>
+              <a:pPr algn="ctr"/>
+              <a:endParaRPr lang="en-US"/>
+            </a:p>
+          </p:txBody>
+        </p:sp>
+        <p:sp>
+          <p:nvSpPr>
+            <p:cNvPr id="25" name="Isosceles Triangle 24"/>
+            <p:cNvSpPr/>
+            <p:nvPr/>
+          </p:nvSpPr>
+          <p:spPr>
+            <a:xfrm rot="2208847" flipH="1" flipV="1">
+              <a:off x="725215" y="4738121"/>
+              <a:ext cx="916387" cy="834311"/>
+            </a:xfrm>
+            <a:prstGeom prst="triangle">
+              <a:avLst/>
+            </a:prstGeom>
+            <a:solidFill>
+              <a:schemeClr val="accent1">
+                <a:lumMod val="60000"/>
+                <a:lumOff val="40000"/>
+              </a:schemeClr>
+            </a:solidFill>
+            <a:ln>
+              <a:noFill/>
+            </a:ln>
+            <a:effectLst/>
+          </p:spPr>
+          <p:style>
+            <a:lnRef idx="1">
+              <a:schemeClr val="accent1"/>
+            </a:lnRef>
+            <a:fillRef idx="3">
+              <a:schemeClr val="accent1"/>
+            </a:fillRef>
+            <a:effectRef idx="2">
+              <a:schemeClr val="accent1"/>
+            </a:effectRef>
+            <a:fontRef idx="minor">
+              <a:schemeClr val="lt1"/>
+            </a:fontRef>
+          </p:style>
+          <p:txBody>
+            <a:bodyPr rtlCol="0" anchor="ctr"/>
+            <a:lstStyle/>
+            <a:p>
+              <a:pPr algn="ctr"/>
+              <a:endParaRPr lang="en-US"/>
+            </a:p>
+          </p:txBody>
+        </p:sp>
+        <p:sp>
+          <p:nvSpPr>
+            <p:cNvPr id="26" name="Right Triangle 25"/>
+            <p:cNvSpPr/>
+            <p:nvPr/>
+          </p:nvSpPr>
+          <p:spPr>
+            <a:xfrm flipH="1">
+              <a:off x="933198" y="6402867"/>
+              <a:ext cx="439163" cy="379490"/>
+            </a:xfrm>
+            <a:prstGeom prst="rtTriangle">
+              <a:avLst/>
+            </a:prstGeom>
+            <a:solidFill>
+              <a:schemeClr val="accent1">
+                <a:lumMod val="50000"/>
+              </a:schemeClr>
+            </a:solidFill>
+            <a:ln>
+              <a:noFill/>
+            </a:ln>
+            <a:effectLst/>
+          </p:spPr>
+          <p:style>
+            <a:lnRef idx="1">
+              <a:schemeClr val="accent1"/>
+            </a:lnRef>
+            <a:fillRef idx="3">
+              <a:schemeClr val="accent1"/>
+            </a:fillRef>
+            <a:effectRef idx="2">
+              <a:schemeClr val="accent1"/>
+            </a:effectRef>
+            <a:fontRef idx="minor">
+              <a:schemeClr val="lt1"/>
+            </a:fontRef>
+          </p:style>
+          <p:txBody>
+            <a:bodyPr rtlCol="0" anchor="ctr"/>
+            <a:lstStyle/>
+            <a:p>
+              <a:pPr algn="ctr"/>
+              <a:endParaRPr lang="en-US"/>
+            </a:p>
+          </p:txBody>
+        </p:sp>
+        <p:sp>
+          <p:nvSpPr>
+            <p:cNvPr id="27" name="Right Triangle 26"/>
+            <p:cNvSpPr/>
+            <p:nvPr/>
+          </p:nvSpPr>
+          <p:spPr>
+            <a:xfrm rot="1440107">
+              <a:off x="1819965" y="5836838"/>
+              <a:ext cx="800180" cy="811575"/>
+            </a:xfrm>
+            <a:prstGeom prst="rtTriangle">
+              <a:avLst/>
+            </a:prstGeom>
+            <a:solidFill>
+              <a:schemeClr val="tx2">
+                <a:lumMod val="50000"/>
+              </a:schemeClr>
+            </a:solidFill>
+            <a:ln>
+              <a:noFill/>
+            </a:ln>
+            <a:effectLst/>
+          </p:spPr>
+          <p:style>
+            <a:lnRef idx="1">
+              <a:schemeClr val="accent1"/>
+            </a:lnRef>
+            <a:fillRef idx="3">
+              <a:schemeClr val="accent1"/>
+            </a:fillRef>
+            <a:effectRef idx="2">
+              <a:schemeClr val="accent1"/>
+            </a:effectRef>
+            <a:fontRef idx="minor">
+              <a:schemeClr val="lt1"/>
+            </a:fontRef>
+          </p:style>
+          <p:txBody>
+            <a:bodyPr rtlCol="0" anchor="ctr"/>
+            <a:lstStyle/>
+            <a:p>
+              <a:pPr algn="ctr"/>
+              <a:endParaRPr lang="en-US"/>
+            </a:p>
+          </p:txBody>
+        </p:sp>
+        <p:sp>
+          <p:nvSpPr>
+            <p:cNvPr id="28" name="Isosceles Triangle 27"/>
+            <p:cNvSpPr/>
+            <p:nvPr/>
+          </p:nvSpPr>
+          <p:spPr>
+            <a:xfrm rot="1945215">
+              <a:off x="1806658" y="5108442"/>
+              <a:ext cx="1044222" cy="740633"/>
+            </a:xfrm>
+            <a:prstGeom prst="triangle">
+              <a:avLst/>
+            </a:prstGeom>
+            <a:solidFill>
+              <a:schemeClr val="tx2">
+                <a:lumMod val="75000"/>
+              </a:schemeClr>
+            </a:solidFill>
+            <a:ln>
+              <a:noFill/>
+            </a:ln>
+            <a:effectLst/>
+          </p:spPr>
+          <p:style>
+            <a:lnRef idx="1">
+              <a:schemeClr val="accent1"/>
+            </a:lnRef>
+            <a:fillRef idx="3">
+              <a:schemeClr val="accent1"/>
+            </a:fillRef>
+            <a:effectRef idx="2">
+              <a:schemeClr val="accent1"/>
+            </a:effectRef>
+            <a:fontRef idx="minor">
+              <a:schemeClr val="lt1"/>
+            </a:fontRef>
+          </p:style>
+          <p:txBody>
+            <a:bodyPr rtlCol="0" anchor="ctr"/>
+            <a:lstStyle/>
+            <a:p>
+              <a:pPr algn="ctr"/>
+              <a:endParaRPr lang="en-US"/>
+            </a:p>
+          </p:txBody>
+        </p:sp>
+        <p:sp>
+          <p:nvSpPr>
+            <p:cNvPr id="29" name="Isosceles Triangle 28"/>
+            <p:cNvSpPr/>
+            <p:nvPr/>
+          </p:nvSpPr>
+          <p:spPr>
+            <a:xfrm rot="3867000">
+              <a:off x="1961509" y="4454715"/>
+              <a:ext cx="585363" cy="971967"/>
+            </a:xfrm>
+            <a:prstGeom prst="triangle">
+              <a:avLst/>
+            </a:prstGeom>
+            <a:solidFill>
+              <a:schemeClr val="tx2">
+                <a:lumMod val="60000"/>
+                <a:lumOff val="40000"/>
+              </a:schemeClr>
+            </a:solidFill>
+            <a:ln>
+              <a:noFill/>
+            </a:ln>
+            <a:effectLst/>
+          </p:spPr>
+          <p:style>
+            <a:lnRef idx="1">
+              <a:schemeClr val="accent1"/>
+            </a:lnRef>
+            <a:fillRef idx="3">
+              <a:schemeClr val="accent1"/>
+            </a:fillRef>
+            <a:effectRef idx="2">
+              <a:schemeClr val="accent1"/>
+            </a:effectRef>
+            <a:fontRef idx="minor">
+              <a:schemeClr val="lt1"/>
+            </a:fontRef>
+          </p:style>
+          <p:txBody>
+            <a:bodyPr rtlCol="0" anchor="ctr"/>
+            <a:lstStyle/>
+            <a:p>
+              <a:pPr algn="ctr"/>
+              <a:endParaRPr lang="en-US"/>
+            </a:p>
+          </p:txBody>
+        </p:sp>
+        <p:sp>
+          <p:nvSpPr>
+            <p:cNvPr id="30" name="Right Triangle 29"/>
+            <p:cNvSpPr/>
+            <p:nvPr/>
+          </p:nvSpPr>
+          <p:spPr>
+            <a:xfrm rot="20725757" flipH="1">
+              <a:off x="2193994" y="5391216"/>
+              <a:ext cx="938424" cy="1073302"/>
+            </a:xfrm>
+            <a:prstGeom prst="rtTriangle">
+              <a:avLst/>
+            </a:prstGeom>
+            <a:solidFill>
+              <a:schemeClr val="accent1">
+                <a:lumMod val="75000"/>
+              </a:schemeClr>
+            </a:solidFill>
+            <a:ln>
+              <a:noFill/>
+            </a:ln>
+            <a:effectLst/>
+          </p:spPr>
+          <p:style>
+            <a:lnRef idx="1">
+              <a:schemeClr val="accent1"/>
+            </a:lnRef>
+            <a:fillRef idx="3">
+              <a:schemeClr val="accent1"/>
+            </a:fillRef>
+            <a:effectRef idx="2">
+              <a:schemeClr val="accent1"/>
+            </a:effectRef>
+            <a:fontRef idx="minor">
+              <a:schemeClr val="lt1"/>
+            </a:fontRef>
+          </p:style>
+          <p:txBody>
+            <a:bodyPr rtlCol="0" anchor="ctr"/>
+            <a:lstStyle/>
+            <a:p>
+              <a:pPr algn="ctr"/>
+              <a:endParaRPr lang="en-US"/>
+            </a:p>
+          </p:txBody>
+        </p:sp>
+        <p:sp>
+          <p:nvSpPr>
+            <p:cNvPr id="31" name="Isosceles Triangle 30"/>
+            <p:cNvSpPr/>
+            <p:nvPr/>
+          </p:nvSpPr>
+          <p:spPr>
+            <a:xfrm rot="2208847" flipH="1" flipV="1">
+              <a:off x="2332328" y="4738120"/>
+              <a:ext cx="916387" cy="834311"/>
+            </a:xfrm>
+            <a:prstGeom prst="triangle">
+              <a:avLst/>
+            </a:prstGeom>
+            <a:solidFill>
+              <a:schemeClr val="accent1">
+                <a:lumMod val="60000"/>
+                <a:lumOff val="40000"/>
+              </a:schemeClr>
+            </a:solidFill>
+            <a:ln>
+              <a:noFill/>
+            </a:ln>
+            <a:effectLst/>
+          </p:spPr>
+          <p:style>
+            <a:lnRef idx="1">
+              <a:schemeClr val="accent1"/>
+            </a:lnRef>
+            <a:fillRef idx="3">
+              <a:schemeClr val="accent1"/>
+            </a:fillRef>
+            <a:effectRef idx="2">
+              <a:schemeClr val="accent1"/>
+            </a:effectRef>
+            <a:fontRef idx="minor">
+              <a:schemeClr val="lt1"/>
+            </a:fontRef>
+          </p:style>
+          <p:txBody>
+            <a:bodyPr rtlCol="0" anchor="ctr"/>
+            <a:lstStyle/>
+            <a:p>
+              <a:pPr algn="ctr"/>
+              <a:endParaRPr lang="en-US"/>
+            </a:p>
+          </p:txBody>
+        </p:sp>
+        <p:sp>
+          <p:nvSpPr>
+            <p:cNvPr id="32" name="Right Triangle 31"/>
+            <p:cNvSpPr/>
+            <p:nvPr/>
+          </p:nvSpPr>
+          <p:spPr>
+            <a:xfrm flipH="1">
+              <a:off x="2540311" y="6402866"/>
+              <a:ext cx="439163" cy="379490"/>
+            </a:xfrm>
+            <a:prstGeom prst="rtTriangle">
+              <a:avLst/>
+            </a:prstGeom>
+            <a:solidFill>
+              <a:schemeClr val="accent1">
+                <a:lumMod val="50000"/>
+              </a:schemeClr>
+            </a:solidFill>
+            <a:ln>
+              <a:noFill/>
+            </a:ln>
+            <a:effectLst/>
+          </p:spPr>
+          <p:style>
+            <a:lnRef idx="1">
+              <a:schemeClr val="accent1"/>
+            </a:lnRef>
+            <a:fillRef idx="3">
+              <a:schemeClr val="accent1"/>
+            </a:fillRef>
+            <a:effectRef idx="2">
+              <a:schemeClr val="accent1"/>
+            </a:effectRef>
+            <a:fontRef idx="minor">
+              <a:schemeClr val="lt1"/>
+            </a:fontRef>
+          </p:style>
+          <p:txBody>
+            <a:bodyPr rtlCol="0" anchor="ctr"/>
+            <a:lstStyle/>
+            <a:p>
+              <a:pPr algn="ctr"/>
+              <a:endParaRPr lang="en-US"/>
+            </a:p>
+          </p:txBody>
+        </p:sp>
+        <p:sp>
+          <p:nvSpPr>
+            <p:cNvPr id="33" name="Right Triangle 32"/>
+            <p:cNvSpPr/>
+            <p:nvPr/>
+          </p:nvSpPr>
+          <p:spPr>
+            <a:xfrm rot="1440107">
+              <a:off x="3432969" y="5836840"/>
+              <a:ext cx="800180" cy="811575"/>
+            </a:xfrm>
+            <a:prstGeom prst="rtTriangle">
+              <a:avLst/>
+            </a:prstGeom>
+            <a:solidFill>
+              <a:schemeClr val="tx2">
+                <a:lumMod val="50000"/>
+              </a:schemeClr>
+            </a:solidFill>
+            <a:ln>
+              <a:noFill/>
+            </a:ln>
+            <a:effectLst/>
+          </p:spPr>
+          <p:style>
+            <a:lnRef idx="1">
+              <a:schemeClr val="accent1"/>
+            </a:lnRef>
+            <a:fillRef idx="3">
+              <a:schemeClr val="accent1"/>
+            </a:fillRef>
+            <a:effectRef idx="2">
+              <a:schemeClr val="accent1"/>
+            </a:effectRef>
+            <a:fontRef idx="minor">
+              <a:schemeClr val="lt1"/>
+            </a:fontRef>
+          </p:style>
+          <p:txBody>
+            <a:bodyPr rtlCol="0" anchor="ctr"/>
+            <a:lstStyle/>
+            <a:p>
+              <a:pPr algn="ctr"/>
+              <a:endParaRPr lang="en-US"/>
+            </a:p>
+          </p:txBody>
+        </p:sp>
+        <p:sp>
+          <p:nvSpPr>
+            <p:cNvPr id="34" name="Isosceles Triangle 33"/>
+            <p:cNvSpPr/>
+            <p:nvPr/>
+          </p:nvSpPr>
+          <p:spPr>
+            <a:xfrm rot="1945215">
+              <a:off x="3419662" y="5108444"/>
+              <a:ext cx="1044222" cy="740633"/>
+            </a:xfrm>
+            <a:prstGeom prst="triangle">
+              <a:avLst/>
+            </a:prstGeom>
+            <a:solidFill>
+              <a:schemeClr val="tx2">
+                <a:lumMod val="75000"/>
+              </a:schemeClr>
+            </a:solidFill>
+            <a:ln>
+              <a:noFill/>
+            </a:ln>
+            <a:effectLst/>
+          </p:spPr>
+          <p:style>
+            <a:lnRef idx="1">
+              <a:schemeClr val="accent1"/>
+            </a:lnRef>
+            <a:fillRef idx="3">
+              <a:schemeClr val="accent1"/>
+            </a:fillRef>
+            <a:effectRef idx="2">
+              <a:schemeClr val="accent1"/>
+            </a:effectRef>
+            <a:fontRef idx="minor">
+              <a:schemeClr val="lt1"/>
+            </a:fontRef>
+          </p:style>
+          <p:txBody>
+            <a:bodyPr rtlCol="0" anchor="ctr"/>
+            <a:lstStyle/>
+            <a:p>
+              <a:pPr algn="ctr"/>
+              <a:endParaRPr lang="en-US"/>
+            </a:p>
+          </p:txBody>
+        </p:sp>
+        <p:sp>
+          <p:nvSpPr>
+            <p:cNvPr id="35" name="Isosceles Triangle 34"/>
+            <p:cNvSpPr/>
+            <p:nvPr/>
+          </p:nvSpPr>
+          <p:spPr>
+            <a:xfrm rot="3867000">
+              <a:off x="3574513" y="4454717"/>
+              <a:ext cx="585363" cy="971967"/>
+            </a:xfrm>
+            <a:prstGeom prst="triangle">
+              <a:avLst/>
+            </a:prstGeom>
+            <a:solidFill>
+              <a:schemeClr val="tx2">
+                <a:lumMod val="60000"/>
+                <a:lumOff val="40000"/>
+              </a:schemeClr>
+            </a:solidFill>
+            <a:ln>
+              <a:noFill/>
+            </a:ln>
+            <a:effectLst/>
+          </p:spPr>
+          <p:style>
+            <a:lnRef idx="1">
+              <a:schemeClr val="accent1"/>
+            </a:lnRef>
+            <a:fillRef idx="3">
+              <a:schemeClr val="accent1"/>
+            </a:fillRef>
+            <a:effectRef idx="2">
+              <a:schemeClr val="accent1"/>
+            </a:effectRef>
+            <a:fontRef idx="minor">
+              <a:schemeClr val="lt1"/>
+            </a:fontRef>
+          </p:style>
+          <p:txBody>
+            <a:bodyPr rtlCol="0" anchor="ctr"/>
+            <a:lstStyle/>
+            <a:p>
+              <a:pPr algn="ctr"/>
+              <a:endParaRPr lang="en-US"/>
+            </a:p>
+          </p:txBody>
+        </p:sp>
+        <p:sp>
+          <p:nvSpPr>
+            <p:cNvPr id="36" name="Right Triangle 35"/>
+            <p:cNvSpPr/>
+            <p:nvPr/>
+          </p:nvSpPr>
+          <p:spPr>
+            <a:xfrm rot="20725757" flipH="1">
+              <a:off x="3806998" y="5391218"/>
+              <a:ext cx="938424" cy="1073302"/>
+            </a:xfrm>
+            <a:prstGeom prst="rtTriangle">
+              <a:avLst/>
+            </a:prstGeom>
+            <a:solidFill>
+              <a:schemeClr val="accent1">
+                <a:lumMod val="75000"/>
+              </a:schemeClr>
+            </a:solidFill>
+            <a:ln>
+              <a:noFill/>
+            </a:ln>
+            <a:effectLst/>
+          </p:spPr>
+          <p:style>
+            <a:lnRef idx="1">
+              <a:schemeClr val="accent1"/>
+            </a:lnRef>
+            <a:fillRef idx="3">
+              <a:schemeClr val="accent1"/>
+            </a:fillRef>
+            <a:effectRef idx="2">
+              <a:schemeClr val="accent1"/>
+            </a:effectRef>
+            <a:fontRef idx="minor">
+              <a:schemeClr val="lt1"/>
+            </a:fontRef>
+          </p:style>
+          <p:txBody>
+            <a:bodyPr rtlCol="0" anchor="ctr"/>
+            <a:lstStyle/>
+            <a:p>
+              <a:pPr algn="ctr"/>
+              <a:endParaRPr lang="en-US"/>
+            </a:p>
+          </p:txBody>
+        </p:sp>
+        <p:sp>
+          <p:nvSpPr>
+            <p:cNvPr id="37" name="Isosceles Triangle 36"/>
+            <p:cNvSpPr/>
+            <p:nvPr/>
+          </p:nvSpPr>
+          <p:spPr>
+            <a:xfrm rot="2208847" flipH="1" flipV="1">
+              <a:off x="3945332" y="4738122"/>
+              <a:ext cx="916387" cy="834311"/>
+            </a:xfrm>
+            <a:prstGeom prst="triangle">
+              <a:avLst/>
+            </a:prstGeom>
+            <a:solidFill>
+              <a:schemeClr val="accent1">
+                <a:lumMod val="60000"/>
+                <a:lumOff val="40000"/>
+              </a:schemeClr>
+            </a:solidFill>
+            <a:ln>
+              <a:noFill/>
+            </a:ln>
+            <a:effectLst/>
+          </p:spPr>
+          <p:style>
+            <a:lnRef idx="1">
+              <a:schemeClr val="accent1"/>
+            </a:lnRef>
+            <a:fillRef idx="3">
+              <a:schemeClr val="accent1"/>
+            </a:fillRef>
+            <a:effectRef idx="2">
+              <a:schemeClr val="accent1"/>
+            </a:effectRef>
+            <a:fontRef idx="minor">
+              <a:schemeClr val="lt1"/>
+            </a:fontRef>
+          </p:style>
+          <p:txBody>
+            <a:bodyPr rtlCol="0" anchor="ctr"/>
+            <a:lstStyle/>
+            <a:p>
+              <a:pPr algn="ctr"/>
+              <a:endParaRPr lang="en-US"/>
+            </a:p>
+          </p:txBody>
+        </p:sp>
+        <p:sp>
+          <p:nvSpPr>
+            <p:cNvPr id="38" name="Right Triangle 37"/>
+            <p:cNvSpPr/>
+            <p:nvPr/>
+          </p:nvSpPr>
+          <p:spPr>
+            <a:xfrm flipH="1">
+              <a:off x="4153315" y="6402868"/>
+              <a:ext cx="439163" cy="379490"/>
+            </a:xfrm>
+            <a:prstGeom prst="rtTriangle">
+              <a:avLst/>
+            </a:prstGeom>
+            <a:solidFill>
+              <a:schemeClr val="accent1">
+                <a:lumMod val="50000"/>
+              </a:schemeClr>
+            </a:solidFill>
+            <a:ln>
+              <a:noFill/>
+            </a:ln>
+            <a:effectLst/>
+          </p:spPr>
+          <p:style>
+            <a:lnRef idx="1">
+              <a:schemeClr val="accent1"/>
+            </a:lnRef>
+            <a:fillRef idx="3">
+              <a:schemeClr val="accent1"/>
+            </a:fillRef>
+            <a:effectRef idx="2">
+              <a:schemeClr val="accent1"/>
+            </a:effectRef>
+            <a:fontRef idx="minor">
+              <a:schemeClr val="lt1"/>
+            </a:fontRef>
+          </p:style>
+          <p:txBody>
+            <a:bodyPr rtlCol="0" anchor="ctr"/>
+            <a:lstStyle/>
+            <a:p>
+              <a:pPr algn="ctr"/>
+              <a:endParaRPr lang="en-US"/>
+            </a:p>
+          </p:txBody>
+        </p:sp>
+        <p:sp>
+          <p:nvSpPr>
+            <p:cNvPr id="39" name="Right Triangle 38"/>
+            <p:cNvSpPr/>
+            <p:nvPr/>
+          </p:nvSpPr>
+          <p:spPr>
+            <a:xfrm rot="1440107">
+              <a:off x="5040082" y="5836839"/>
+              <a:ext cx="800180" cy="811575"/>
+            </a:xfrm>
+            <a:prstGeom prst="rtTriangle">
+              <a:avLst/>
+            </a:prstGeom>
+            <a:solidFill>
+              <a:schemeClr val="tx2">
+                <a:lumMod val="50000"/>
+              </a:schemeClr>
+            </a:solidFill>
+            <a:ln>
+              <a:noFill/>
+            </a:ln>
+            <a:effectLst/>
+          </p:spPr>
+          <p:style>
+            <a:lnRef idx="1">
+              <a:schemeClr val="accent1"/>
+            </a:lnRef>
+            <a:fillRef idx="3">
+              <a:schemeClr val="accent1"/>
+            </a:fillRef>
+            <a:effectRef idx="2">
+              <a:schemeClr val="accent1"/>
+            </a:effectRef>
+            <a:fontRef idx="minor">
+              <a:schemeClr val="lt1"/>
+            </a:fontRef>
+          </p:style>
+          <p:txBody>
+            <a:bodyPr rtlCol="0" anchor="ctr"/>
+            <a:lstStyle/>
+            <a:p>
+              <a:pPr algn="ctr"/>
+              <a:endParaRPr lang="en-US"/>
+            </a:p>
+          </p:txBody>
+        </p:sp>
+        <p:sp>
+          <p:nvSpPr>
+            <p:cNvPr id="40" name="Isosceles Triangle 39"/>
+            <p:cNvSpPr/>
+            <p:nvPr/>
+          </p:nvSpPr>
+          <p:spPr>
+            <a:xfrm rot="1945215">
+              <a:off x="5026775" y="5108443"/>
+              <a:ext cx="1044222" cy="740633"/>
+            </a:xfrm>
+            <a:prstGeom prst="triangle">
+              <a:avLst/>
+            </a:prstGeom>
+            <a:solidFill>
+              <a:schemeClr val="tx2">
+                <a:lumMod val="75000"/>
+              </a:schemeClr>
+            </a:solidFill>
+            <a:ln>
+              <a:noFill/>
+            </a:ln>
+            <a:effectLst/>
+          </p:spPr>
+          <p:style>
+            <a:lnRef idx="1">
+              <a:schemeClr val="accent1"/>
+            </a:lnRef>
+            <a:fillRef idx="3">
+              <a:schemeClr val="accent1"/>
+            </a:fillRef>
+            <a:effectRef idx="2">
+              <a:schemeClr val="accent1"/>
+            </a:effectRef>
+            <a:fontRef idx="minor">
+              <a:schemeClr val="lt1"/>
+            </a:fontRef>
+          </p:style>
+          <p:txBody>
+            <a:bodyPr rtlCol="0" anchor="ctr"/>
+            <a:lstStyle/>
+            <a:p>
+              <a:pPr algn="ctr"/>
+              <a:endParaRPr lang="en-US"/>
+            </a:p>
+          </p:txBody>
+        </p:sp>
+        <p:sp>
+          <p:nvSpPr>
+            <p:cNvPr id="41" name="Isosceles Triangle 40"/>
+            <p:cNvSpPr/>
+            <p:nvPr/>
+          </p:nvSpPr>
+          <p:spPr>
+            <a:xfrm rot="3867000">
+              <a:off x="5181626" y="4454716"/>
+              <a:ext cx="585363" cy="971967"/>
+            </a:xfrm>
+            <a:prstGeom prst="triangle">
+              <a:avLst/>
+            </a:prstGeom>
+            <a:solidFill>
+              <a:schemeClr val="tx2">
+                <a:lumMod val="60000"/>
+                <a:lumOff val="40000"/>
+              </a:schemeClr>
+            </a:solidFill>
+            <a:ln>
+              <a:noFill/>
+            </a:ln>
+            <a:effectLst/>
+          </p:spPr>
+          <p:style>
+            <a:lnRef idx="1">
+              <a:schemeClr val="accent1"/>
+            </a:lnRef>
+            <a:fillRef idx="3">
+              <a:schemeClr val="accent1"/>
+            </a:fillRef>
+            <a:effectRef idx="2">
+              <a:schemeClr val="accent1"/>
+            </a:effectRef>
+            <a:fontRef idx="minor">
+              <a:schemeClr val="lt1"/>
+            </a:fontRef>
+          </p:style>
+          <p:txBody>
+            <a:bodyPr rtlCol="0" anchor="ctr"/>
+            <a:lstStyle/>
+            <a:p>
+              <a:pPr algn="ctr"/>
+              <a:endParaRPr lang="en-US"/>
+            </a:p>
+          </p:txBody>
+        </p:sp>
+        <p:sp>
+          <p:nvSpPr>
+            <p:cNvPr id="42" name="Right Triangle 41"/>
+            <p:cNvSpPr/>
+            <p:nvPr/>
+          </p:nvSpPr>
+          <p:spPr>
+            <a:xfrm rot="20725757" flipH="1">
+              <a:off x="5414111" y="5391217"/>
+              <a:ext cx="938424" cy="1073302"/>
+            </a:xfrm>
+            <a:prstGeom prst="rtTriangle">
+              <a:avLst/>
+            </a:prstGeom>
+            <a:solidFill>
+              <a:schemeClr val="accent1">
+                <a:lumMod val="75000"/>
+              </a:schemeClr>
+            </a:solidFill>
+            <a:ln>
+              <a:noFill/>
+            </a:ln>
+            <a:effectLst/>
+          </p:spPr>
+          <p:style>
+            <a:lnRef idx="1">
+              <a:schemeClr val="accent1"/>
+            </a:lnRef>
+            <a:fillRef idx="3">
+              <a:schemeClr val="accent1"/>
+            </a:fillRef>
+            <a:effectRef idx="2">
+              <a:schemeClr val="accent1"/>
+            </a:effectRef>
+            <a:fontRef idx="minor">
+              <a:schemeClr val="lt1"/>
+            </a:fontRef>
+          </p:style>
+          <p:txBody>
+            <a:bodyPr rtlCol="0" anchor="ctr"/>
+            <a:lstStyle/>
+            <a:p>
+              <a:pPr algn="ctr"/>
+              <a:endParaRPr lang="en-US"/>
+            </a:p>
+          </p:txBody>
+        </p:sp>
+        <p:sp>
+          <p:nvSpPr>
+            <p:cNvPr id="43" name="Isosceles Triangle 42"/>
+            <p:cNvSpPr/>
+            <p:nvPr/>
+          </p:nvSpPr>
+          <p:spPr>
+            <a:xfrm rot="2208847" flipH="1" flipV="1">
+              <a:off x="5552445" y="4738121"/>
+              <a:ext cx="916387" cy="834311"/>
+            </a:xfrm>
+            <a:prstGeom prst="triangle">
+              <a:avLst/>
+            </a:prstGeom>
+            <a:solidFill>
+              <a:schemeClr val="accent1">
+                <a:lumMod val="60000"/>
+                <a:lumOff val="40000"/>
+              </a:schemeClr>
+            </a:solidFill>
+            <a:ln>
+              <a:noFill/>
+            </a:ln>
+            <a:effectLst/>
+          </p:spPr>
+          <p:style>
+            <a:lnRef idx="1">
+              <a:schemeClr val="accent1"/>
+            </a:lnRef>
+            <a:fillRef idx="3">
+              <a:schemeClr val="accent1"/>
+            </a:fillRef>
+            <a:effectRef idx="2">
+              <a:schemeClr val="accent1"/>
+            </a:effectRef>
+            <a:fontRef idx="minor">
+              <a:schemeClr val="lt1"/>
+            </a:fontRef>
+          </p:style>
+          <p:txBody>
+            <a:bodyPr rtlCol="0" anchor="ctr"/>
+            <a:lstStyle/>
+            <a:p>
+              <a:pPr algn="ctr"/>
+              <a:endParaRPr lang="en-US"/>
+            </a:p>
+          </p:txBody>
+        </p:sp>
+        <p:sp>
+          <p:nvSpPr>
+            <p:cNvPr id="44" name="Right Triangle 43"/>
+            <p:cNvSpPr/>
+            <p:nvPr/>
+          </p:nvSpPr>
+          <p:spPr>
+            <a:xfrm flipH="1">
+              <a:off x="5760428" y="6402867"/>
+              <a:ext cx="439163" cy="379490"/>
+            </a:xfrm>
+            <a:prstGeom prst="rtTriangle">
+              <a:avLst/>
+            </a:prstGeom>
+            <a:solidFill>
+              <a:schemeClr val="accent1">
+                <a:lumMod val="50000"/>
+              </a:schemeClr>
+            </a:solidFill>
+            <a:ln>
+              <a:noFill/>
+            </a:ln>
+            <a:effectLst/>
+          </p:spPr>
+          <p:style>
+            <a:lnRef idx="1">
+              <a:schemeClr val="accent1"/>
+            </a:lnRef>
+            <a:fillRef idx="3">
+              <a:schemeClr val="accent1"/>
+            </a:fillRef>
+            <a:effectRef idx="2">
+              <a:schemeClr val="accent1"/>
+            </a:effectRef>
+            <a:fontRef idx="minor">
+              <a:schemeClr val="lt1"/>
+            </a:fontRef>
+          </p:style>
+          <p:txBody>
+            <a:bodyPr rtlCol="0" anchor="ctr"/>
+            <a:lstStyle/>
+            <a:p>
+              <a:pPr algn="ctr"/>
+              <a:endParaRPr lang="en-US"/>
+            </a:p>
+          </p:txBody>
+        </p:sp>
+        <p:sp>
+          <p:nvSpPr>
+            <p:cNvPr id="69" name="Right Triangle 68"/>
+            <p:cNvSpPr/>
+            <p:nvPr/>
+          </p:nvSpPr>
+          <p:spPr>
+            <a:xfrm rot="1440107">
+              <a:off x="199062" y="3602211"/>
+              <a:ext cx="800180" cy="811575"/>
+            </a:xfrm>
+            <a:prstGeom prst="rtTriangle">
+              <a:avLst/>
+            </a:prstGeom>
+            <a:solidFill>
+              <a:schemeClr val="tx2">
+                <a:lumMod val="50000"/>
+              </a:schemeClr>
+            </a:solidFill>
+            <a:ln>
+              <a:noFill/>
+            </a:ln>
+            <a:effectLst/>
+          </p:spPr>
+          <p:style>
+            <a:lnRef idx="1">
+              <a:schemeClr val="accent1"/>
+            </a:lnRef>
+            <a:fillRef idx="3">
+              <a:schemeClr val="accent1"/>
+            </a:fillRef>
+            <a:effectRef idx="2">
+              <a:schemeClr val="accent1"/>
+            </a:effectRef>
+            <a:fontRef idx="minor">
+              <a:schemeClr val="lt1"/>
+            </a:fontRef>
+          </p:style>
+          <p:txBody>
+            <a:bodyPr rtlCol="0" anchor="ctr"/>
+            <a:lstStyle/>
+            <a:p>
+              <a:pPr algn="ctr"/>
+              <a:endParaRPr lang="en-US"/>
+            </a:p>
+          </p:txBody>
+        </p:sp>
+        <p:sp>
+          <p:nvSpPr>
+            <p:cNvPr id="70" name="Isosceles Triangle 69"/>
+            <p:cNvSpPr/>
+            <p:nvPr/>
+          </p:nvSpPr>
+          <p:spPr>
+            <a:xfrm rot="1945215">
+              <a:off x="185755" y="2873815"/>
+              <a:ext cx="1044222" cy="740633"/>
+            </a:xfrm>
+            <a:prstGeom prst="triangle">
+              <a:avLst/>
+            </a:prstGeom>
+            <a:solidFill>
+              <a:schemeClr val="tx2">
+                <a:lumMod val="75000"/>
+              </a:schemeClr>
+            </a:solidFill>
+            <a:ln>
+              <a:noFill/>
+            </a:ln>
+            <a:effectLst/>
+          </p:spPr>
+          <p:style>
+            <a:lnRef idx="1">
+              <a:schemeClr val="accent1"/>
+            </a:lnRef>
+            <a:fillRef idx="3">
+              <a:schemeClr val="accent1"/>
+            </a:fillRef>
+            <a:effectRef idx="2">
+              <a:schemeClr val="accent1"/>
+            </a:effectRef>
+            <a:fontRef idx="minor">
+              <a:schemeClr val="lt1"/>
+            </a:fontRef>
+          </p:style>
+          <p:txBody>
+            <a:bodyPr rtlCol="0" anchor="ctr"/>
+            <a:lstStyle/>
+            <a:p>
+              <a:pPr algn="ctr"/>
+              <a:endParaRPr lang="en-US"/>
+            </a:p>
+          </p:txBody>
+        </p:sp>
+        <p:sp>
+          <p:nvSpPr>
+            <p:cNvPr id="71" name="Isosceles Triangle 70"/>
+            <p:cNvSpPr/>
+            <p:nvPr/>
+          </p:nvSpPr>
+          <p:spPr>
+            <a:xfrm rot="3867000">
+              <a:off x="340606" y="2220088"/>
+              <a:ext cx="585363" cy="971967"/>
+            </a:xfrm>
+            <a:prstGeom prst="triangle">
+              <a:avLst/>
+            </a:prstGeom>
+            <a:solidFill>
+              <a:schemeClr val="tx2">
+                <a:lumMod val="60000"/>
+                <a:lumOff val="40000"/>
+              </a:schemeClr>
+            </a:solidFill>
+            <a:ln>
+              <a:noFill/>
+            </a:ln>
+            <a:effectLst/>
+          </p:spPr>
+          <p:style>
+            <a:lnRef idx="1">
+              <a:schemeClr val="accent1"/>
+            </a:lnRef>
+            <a:fillRef idx="3">
+              <a:schemeClr val="accent1"/>
+            </a:fillRef>
+            <a:effectRef idx="2">
+              <a:schemeClr val="accent1"/>
+            </a:effectRef>
+            <a:fontRef idx="minor">
+              <a:schemeClr val="lt1"/>
+            </a:fontRef>
+          </p:style>
+          <p:txBody>
+            <a:bodyPr rtlCol="0" anchor="ctr"/>
+            <a:lstStyle/>
+            <a:p>
+              <a:pPr algn="ctr"/>
+              <a:endParaRPr lang="en-US"/>
+            </a:p>
+          </p:txBody>
+        </p:sp>
+        <p:sp>
+          <p:nvSpPr>
+            <p:cNvPr id="72" name="Right Triangle 71"/>
+            <p:cNvSpPr/>
+            <p:nvPr/>
+          </p:nvSpPr>
+          <p:spPr>
+            <a:xfrm rot="20725757" flipH="1">
+              <a:off x="573091" y="3156589"/>
+              <a:ext cx="938424" cy="1073302"/>
+            </a:xfrm>
+            <a:prstGeom prst="rtTriangle">
+              <a:avLst/>
+            </a:prstGeom>
+            <a:solidFill>
+              <a:schemeClr val="accent1">
+                <a:lumMod val="75000"/>
+              </a:schemeClr>
+            </a:solidFill>
+            <a:ln>
+              <a:noFill/>
+            </a:ln>
+            <a:effectLst/>
+          </p:spPr>
+          <p:style>
+            <a:lnRef idx="1">
+              <a:schemeClr val="accent1"/>
+            </a:lnRef>
+            <a:fillRef idx="3">
+              <a:schemeClr val="accent1"/>
+            </a:fillRef>
+            <a:effectRef idx="2">
+              <a:schemeClr val="accent1"/>
+            </a:effectRef>
+            <a:fontRef idx="minor">
+              <a:schemeClr val="lt1"/>
+            </a:fontRef>
+          </p:style>
+          <p:txBody>
+            <a:bodyPr rtlCol="0" anchor="ctr"/>
+            <a:lstStyle/>
+            <a:p>
+              <a:pPr algn="ctr"/>
+              <a:endParaRPr lang="en-US"/>
+            </a:p>
+          </p:txBody>
+        </p:sp>
+        <p:sp>
+          <p:nvSpPr>
+            <p:cNvPr id="73" name="Isosceles Triangle 72"/>
+            <p:cNvSpPr/>
+            <p:nvPr/>
+          </p:nvSpPr>
+          <p:spPr>
+            <a:xfrm rot="2208847" flipH="1" flipV="1">
+              <a:off x="711425" y="2503493"/>
+              <a:ext cx="916387" cy="834311"/>
+            </a:xfrm>
+            <a:prstGeom prst="triangle">
+              <a:avLst/>
+            </a:prstGeom>
+            <a:solidFill>
+              <a:schemeClr val="accent1">
+                <a:lumMod val="60000"/>
+                <a:lumOff val="40000"/>
+              </a:schemeClr>
+            </a:solidFill>
+            <a:ln>
+              <a:noFill/>
+            </a:ln>
+            <a:effectLst/>
+          </p:spPr>
+          <p:style>
+            <a:lnRef idx="1">
+              <a:schemeClr val="accent1"/>
+            </a:lnRef>
+            <a:fillRef idx="3">
+              <a:schemeClr val="accent1"/>
+            </a:fillRef>
+            <a:effectRef idx="2">
+              <a:schemeClr val="accent1"/>
+            </a:effectRef>
+            <a:fontRef idx="minor">
+              <a:schemeClr val="lt1"/>
+            </a:fontRef>
+          </p:style>
+          <p:txBody>
+            <a:bodyPr rtlCol="0" anchor="ctr"/>
+            <a:lstStyle/>
+            <a:p>
+              <a:pPr algn="ctr"/>
+              <a:endParaRPr lang="en-US"/>
+            </a:p>
+          </p:txBody>
+        </p:sp>
+        <p:sp>
+          <p:nvSpPr>
+            <p:cNvPr id="74" name="Right Triangle 73"/>
+            <p:cNvSpPr/>
+            <p:nvPr/>
+          </p:nvSpPr>
+          <p:spPr>
+            <a:xfrm flipH="1">
+              <a:off x="919408" y="4168239"/>
+              <a:ext cx="439163" cy="379490"/>
+            </a:xfrm>
+            <a:prstGeom prst="rtTriangle">
+              <a:avLst/>
+            </a:prstGeom>
+            <a:solidFill>
+              <a:schemeClr val="accent1">
+                <a:lumMod val="50000"/>
+              </a:schemeClr>
+            </a:solidFill>
+            <a:ln>
+              <a:noFill/>
+            </a:ln>
+            <a:effectLst/>
+          </p:spPr>
+          <p:style>
+            <a:lnRef idx="1">
+              <a:schemeClr val="accent1"/>
+            </a:lnRef>
+            <a:fillRef idx="3">
+              <a:schemeClr val="accent1"/>
+            </a:fillRef>
+            <a:effectRef idx="2">
+              <a:schemeClr val="accent1"/>
+            </a:effectRef>
+            <a:fontRef idx="minor">
+              <a:schemeClr val="lt1"/>
+            </a:fontRef>
+          </p:style>
+          <p:txBody>
+            <a:bodyPr rtlCol="0" anchor="ctr"/>
+            <a:lstStyle/>
+            <a:p>
+              <a:pPr algn="ctr"/>
+              <a:endParaRPr lang="en-US"/>
+            </a:p>
+          </p:txBody>
+        </p:sp>
+        <p:sp>
+          <p:nvSpPr>
+            <p:cNvPr id="75" name="Right Triangle 74"/>
+            <p:cNvSpPr/>
+            <p:nvPr/>
+          </p:nvSpPr>
+          <p:spPr>
+            <a:xfrm rot="1440107">
+              <a:off x="1806175" y="3602210"/>
+              <a:ext cx="800180" cy="811575"/>
+            </a:xfrm>
+            <a:prstGeom prst="rtTriangle">
+              <a:avLst/>
+            </a:prstGeom>
+            <a:solidFill>
+              <a:schemeClr val="tx2">
+                <a:lumMod val="50000"/>
+              </a:schemeClr>
+            </a:solidFill>
+            <a:ln>
+              <a:noFill/>
+            </a:ln>
+            <a:effectLst/>
+          </p:spPr>
+          <p:style>
+            <a:lnRef idx="1">
+              <a:schemeClr val="accent1"/>
+            </a:lnRef>
+            <a:fillRef idx="3">
+              <a:schemeClr val="accent1"/>
+            </a:fillRef>
+            <a:effectRef idx="2">
+              <a:schemeClr val="accent1"/>
+            </a:effectRef>
+            <a:fontRef idx="minor">
+              <a:schemeClr val="lt1"/>
+            </a:fontRef>
+          </p:style>
+          <p:txBody>
+            <a:bodyPr rtlCol="0" anchor="ctr"/>
+            <a:lstStyle/>
+            <a:p>
+              <a:pPr algn="ctr"/>
+              <a:endParaRPr lang="en-US"/>
+            </a:p>
+          </p:txBody>
+        </p:sp>
+        <p:sp>
+          <p:nvSpPr>
+            <p:cNvPr id="76" name="Isosceles Triangle 75"/>
+            <p:cNvSpPr/>
+            <p:nvPr/>
+          </p:nvSpPr>
+          <p:spPr>
+            <a:xfrm rot="1945215">
+              <a:off x="1792868" y="2873814"/>
+              <a:ext cx="1044222" cy="740633"/>
+            </a:xfrm>
+            <a:prstGeom prst="triangle">
+              <a:avLst/>
+            </a:prstGeom>
+            <a:solidFill>
+              <a:schemeClr val="tx2">
+                <a:lumMod val="75000"/>
+              </a:schemeClr>
+            </a:solidFill>
+            <a:ln>
+              <a:noFill/>
+            </a:ln>
+            <a:effectLst/>
+          </p:spPr>
+          <p:style>
+            <a:lnRef idx="1">
+              <a:schemeClr val="accent1"/>
+            </a:lnRef>
+            <a:fillRef idx="3">
+              <a:schemeClr val="accent1"/>
+            </a:fillRef>
+            <a:effectRef idx="2">
+              <a:schemeClr val="accent1"/>
+            </a:effectRef>
+            <a:fontRef idx="minor">
+              <a:schemeClr val="lt1"/>
+            </a:fontRef>
+          </p:style>
+          <p:txBody>
+            <a:bodyPr rtlCol="0" anchor="ctr"/>
+            <a:lstStyle/>
+            <a:p>
+              <a:pPr algn="ctr"/>
+              <a:endParaRPr lang="en-US"/>
+            </a:p>
+          </p:txBody>
+        </p:sp>
+        <p:sp>
+          <p:nvSpPr>
+            <p:cNvPr id="77" name="Isosceles Triangle 76"/>
+            <p:cNvSpPr/>
+            <p:nvPr/>
+          </p:nvSpPr>
+          <p:spPr>
+            <a:xfrm rot="3867000">
+              <a:off x="1947719" y="2220087"/>
+              <a:ext cx="585363" cy="971967"/>
+            </a:xfrm>
+            <a:prstGeom prst="triangle">
+              <a:avLst/>
+            </a:prstGeom>
+            <a:solidFill>
+              <a:schemeClr val="tx2">
+                <a:lumMod val="60000"/>
+                <a:lumOff val="40000"/>
+              </a:schemeClr>
+            </a:solidFill>
+            <a:ln>
+              <a:noFill/>
+            </a:ln>
+            <a:effectLst/>
+          </p:spPr>
+          <p:style>
+            <a:lnRef idx="1">
+              <a:schemeClr val="accent1"/>
+            </a:lnRef>
+            <a:fillRef idx="3">
+              <a:schemeClr val="accent1"/>
+            </a:fillRef>
+            <a:effectRef idx="2">
+              <a:schemeClr val="accent1"/>
+            </a:effectRef>
+            <a:fontRef idx="minor">
+              <a:schemeClr val="lt1"/>
+            </a:fontRef>
+          </p:style>
+          <p:txBody>
+            <a:bodyPr rtlCol="0" anchor="ctr"/>
+            <a:lstStyle/>
+            <a:p>
+              <a:pPr algn="ctr"/>
+              <a:endParaRPr lang="en-US"/>
+            </a:p>
+          </p:txBody>
+        </p:sp>
+        <p:sp>
+          <p:nvSpPr>
+            <p:cNvPr id="78" name="Right Triangle 77"/>
+            <p:cNvSpPr/>
+            <p:nvPr/>
+          </p:nvSpPr>
+          <p:spPr>
+            <a:xfrm rot="20725757" flipH="1">
+              <a:off x="2180204" y="3156588"/>
+              <a:ext cx="938424" cy="1073302"/>
+            </a:xfrm>
+            <a:prstGeom prst="rtTriangle">
+              <a:avLst/>
+            </a:prstGeom>
+            <a:solidFill>
+              <a:schemeClr val="accent1">
+                <a:lumMod val="75000"/>
+              </a:schemeClr>
+            </a:solidFill>
+            <a:ln>
+              <a:noFill/>
+            </a:ln>
+            <a:effectLst/>
+          </p:spPr>
+          <p:style>
+            <a:lnRef idx="1">
+              <a:schemeClr val="accent1"/>
+            </a:lnRef>
+            <a:fillRef idx="3">
+              <a:schemeClr val="accent1"/>
+            </a:fillRef>
+            <a:effectRef idx="2">
+              <a:schemeClr val="accent1"/>
+            </a:effectRef>
+            <a:fontRef idx="minor">
+              <a:schemeClr val="lt1"/>
+            </a:fontRef>
+          </p:style>
+          <p:txBody>
+            <a:bodyPr rtlCol="0" anchor="ctr"/>
+            <a:lstStyle/>
+            <a:p>
+              <a:pPr algn="ctr"/>
+              <a:endParaRPr lang="en-US"/>
+            </a:p>
+          </p:txBody>
+        </p:sp>
+        <p:sp>
+          <p:nvSpPr>
+            <p:cNvPr id="79" name="Isosceles Triangle 78"/>
+            <p:cNvSpPr/>
+            <p:nvPr/>
+          </p:nvSpPr>
+          <p:spPr>
+            <a:xfrm rot="2208847" flipH="1" flipV="1">
+              <a:off x="2318538" y="2503492"/>
+              <a:ext cx="916387" cy="834311"/>
+            </a:xfrm>
+            <a:prstGeom prst="triangle">
+              <a:avLst/>
+            </a:prstGeom>
+            <a:solidFill>
+              <a:schemeClr val="accent1">
+                <a:lumMod val="60000"/>
+                <a:lumOff val="40000"/>
+              </a:schemeClr>
+            </a:solidFill>
+            <a:ln>
+              <a:noFill/>
+            </a:ln>
+            <a:effectLst/>
+          </p:spPr>
+          <p:style>
+            <a:lnRef idx="1">
+              <a:schemeClr val="accent1"/>
+            </a:lnRef>
+            <a:fillRef idx="3">
+              <a:schemeClr val="accent1"/>
+            </a:fillRef>
+            <a:effectRef idx="2">
+              <a:schemeClr val="accent1"/>
+            </a:effectRef>
+            <a:fontRef idx="minor">
+              <a:schemeClr val="lt1"/>
+            </a:fontRef>
+          </p:style>
+          <p:txBody>
+            <a:bodyPr rtlCol="0" anchor="ctr"/>
+            <a:lstStyle/>
+            <a:p>
+              <a:pPr algn="ctr"/>
+              <a:endParaRPr lang="en-US"/>
+            </a:p>
+          </p:txBody>
+        </p:sp>
+        <p:sp>
+          <p:nvSpPr>
+            <p:cNvPr id="80" name="Right Triangle 79"/>
+            <p:cNvSpPr/>
+            <p:nvPr/>
+          </p:nvSpPr>
+          <p:spPr>
+            <a:xfrm flipH="1">
+              <a:off x="2526521" y="4168238"/>
+              <a:ext cx="439163" cy="379490"/>
+            </a:xfrm>
+            <a:prstGeom prst="rtTriangle">
+              <a:avLst/>
+            </a:prstGeom>
+            <a:solidFill>
+              <a:schemeClr val="accent1">
+                <a:lumMod val="50000"/>
+              </a:schemeClr>
+            </a:solidFill>
+            <a:ln>
+              <a:noFill/>
+            </a:ln>
+            <a:effectLst/>
+          </p:spPr>
+          <p:style>
+            <a:lnRef idx="1">
+              <a:schemeClr val="accent1"/>
+            </a:lnRef>
+            <a:fillRef idx="3">
+              <a:schemeClr val="accent1"/>
+            </a:fillRef>
+            <a:effectRef idx="2">
+              <a:schemeClr val="accent1"/>
+            </a:effectRef>
+            <a:fontRef idx="minor">
+              <a:schemeClr val="lt1"/>
+            </a:fontRef>
+          </p:style>
+          <p:txBody>
+            <a:bodyPr rtlCol="0" anchor="ctr"/>
+            <a:lstStyle/>
+            <a:p>
+              <a:pPr algn="ctr"/>
+              <a:endParaRPr lang="en-US"/>
+            </a:p>
+          </p:txBody>
+        </p:sp>
+        <p:sp>
+          <p:nvSpPr>
+            <p:cNvPr id="81" name="Right Triangle 80"/>
+            <p:cNvSpPr/>
+            <p:nvPr/>
+          </p:nvSpPr>
+          <p:spPr>
+            <a:xfrm rot="1440107">
+              <a:off x="3419179" y="3602212"/>
+              <a:ext cx="800180" cy="811575"/>
+            </a:xfrm>
+            <a:prstGeom prst="rtTriangle">
+              <a:avLst/>
+            </a:prstGeom>
+            <a:solidFill>
+              <a:schemeClr val="tx2">
+                <a:lumMod val="50000"/>
+              </a:schemeClr>
+            </a:solidFill>
+            <a:ln>
+              <a:noFill/>
+            </a:ln>
+            <a:effectLst/>
+          </p:spPr>
+          <p:style>
+            <a:lnRef idx="1">
+              <a:schemeClr val="accent1"/>
+            </a:lnRef>
+            <a:fillRef idx="3">
+              <a:schemeClr val="accent1"/>
+            </a:fillRef>
+            <a:effectRef idx="2">
+              <a:schemeClr val="accent1"/>
+            </a:effectRef>
+            <a:fontRef idx="minor">
+              <a:schemeClr val="lt1"/>
+            </a:fontRef>
+          </p:style>
+          <p:txBody>
+            <a:bodyPr rtlCol="0" anchor="ctr"/>
+            <a:lstStyle/>
+            <a:p>
+              <a:pPr algn="ctr"/>
+              <a:endParaRPr lang="en-US"/>
+            </a:p>
+          </p:txBody>
+        </p:sp>
+        <p:sp>
+          <p:nvSpPr>
+            <p:cNvPr id="82" name="Isosceles Triangle 81"/>
+            <p:cNvSpPr/>
+            <p:nvPr/>
+          </p:nvSpPr>
+          <p:spPr>
+            <a:xfrm rot="1945215">
+              <a:off x="3405872" y="2873816"/>
+              <a:ext cx="1044222" cy="740633"/>
+            </a:xfrm>
+            <a:prstGeom prst="triangle">
+              <a:avLst/>
+            </a:prstGeom>
+            <a:solidFill>
+              <a:schemeClr val="tx2">
+                <a:lumMod val="75000"/>
+              </a:schemeClr>
+            </a:solidFill>
+            <a:ln>
+              <a:noFill/>
+            </a:ln>
+            <a:effectLst/>
+          </p:spPr>
+          <p:style>
+            <a:lnRef idx="1">
+              <a:schemeClr val="accent1"/>
+            </a:lnRef>
+            <a:fillRef idx="3">
+              <a:schemeClr val="accent1"/>
+            </a:fillRef>
+            <a:effectRef idx="2">
+              <a:schemeClr val="accent1"/>
+            </a:effectRef>
+            <a:fontRef idx="minor">
+              <a:schemeClr val="lt1"/>
+            </a:fontRef>
+          </p:style>
+          <p:txBody>
+            <a:bodyPr rtlCol="0" anchor="ctr"/>
+            <a:lstStyle/>
+            <a:p>
+              <a:pPr algn="ctr"/>
+              <a:endParaRPr lang="en-US"/>
+            </a:p>
+          </p:txBody>
+        </p:sp>
+        <p:sp>
+          <p:nvSpPr>
+            <p:cNvPr id="83" name="Isosceles Triangle 82"/>
+            <p:cNvSpPr/>
+            <p:nvPr/>
+          </p:nvSpPr>
+          <p:spPr>
+            <a:xfrm rot="3867000">
+              <a:off x="3560723" y="2220089"/>
+              <a:ext cx="585363" cy="971967"/>
+            </a:xfrm>
+            <a:prstGeom prst="triangle">
+              <a:avLst/>
+            </a:prstGeom>
+            <a:solidFill>
+              <a:schemeClr val="tx2">
+                <a:lumMod val="60000"/>
+                <a:lumOff val="40000"/>
+              </a:schemeClr>
+            </a:solidFill>
+            <a:ln>
+              <a:noFill/>
+            </a:ln>
+            <a:effectLst/>
+          </p:spPr>
+          <p:style>
+            <a:lnRef idx="1">
+              <a:schemeClr val="accent1"/>
+            </a:lnRef>
+            <a:fillRef idx="3">
+              <a:schemeClr val="accent1"/>
+            </a:fillRef>
+            <a:effectRef idx="2">
+              <a:schemeClr val="accent1"/>
+            </a:effectRef>
+            <a:fontRef idx="minor">
+              <a:schemeClr val="lt1"/>
+            </a:fontRef>
+          </p:style>
+          <p:txBody>
+            <a:bodyPr rtlCol="0" anchor="ctr"/>
+            <a:lstStyle/>
+            <a:p>
+              <a:pPr algn="ctr"/>
+              <a:endParaRPr lang="en-US"/>
+            </a:p>
+          </p:txBody>
+        </p:sp>
+        <p:sp>
+          <p:nvSpPr>
+            <p:cNvPr id="84" name="Right Triangle 83"/>
+            <p:cNvSpPr/>
+            <p:nvPr/>
+          </p:nvSpPr>
+          <p:spPr>
+            <a:xfrm rot="20725757" flipH="1">
+              <a:off x="3793208" y="3156590"/>
+              <a:ext cx="938424" cy="1073302"/>
+            </a:xfrm>
+            <a:prstGeom prst="rtTriangle">
+              <a:avLst/>
+            </a:prstGeom>
+            <a:solidFill>
+              <a:schemeClr val="accent1">
+                <a:lumMod val="75000"/>
+              </a:schemeClr>
+            </a:solidFill>
+            <a:ln>
+              <a:noFill/>
+            </a:ln>
+            <a:effectLst/>
+          </p:spPr>
+          <p:style>
+            <a:lnRef idx="1">
+              <a:schemeClr val="accent1"/>
+            </a:lnRef>
+            <a:fillRef idx="3">
+              <a:schemeClr val="accent1"/>
+            </a:fillRef>
+            <a:effectRef idx="2">
+              <a:schemeClr val="accent1"/>
+            </a:effectRef>
+            <a:fontRef idx="minor">
+              <a:schemeClr val="lt1"/>
+            </a:fontRef>
+          </p:style>
+          <p:txBody>
+            <a:bodyPr rtlCol="0" anchor="ctr"/>
+            <a:lstStyle/>
+            <a:p>
+              <a:pPr algn="ctr"/>
+              <a:endParaRPr lang="en-US"/>
+            </a:p>
+          </p:txBody>
+        </p:sp>
+        <p:sp>
+          <p:nvSpPr>
+            <p:cNvPr id="85" name="Isosceles Triangle 84"/>
+            <p:cNvSpPr/>
+            <p:nvPr/>
+          </p:nvSpPr>
+          <p:spPr>
+            <a:xfrm rot="2208847" flipH="1" flipV="1">
+              <a:off x="3931542" y="2503494"/>
+              <a:ext cx="916387" cy="834311"/>
+            </a:xfrm>
+            <a:prstGeom prst="triangle">
+              <a:avLst/>
+            </a:prstGeom>
+            <a:solidFill>
+              <a:schemeClr val="accent1">
+                <a:lumMod val="60000"/>
+                <a:lumOff val="40000"/>
+              </a:schemeClr>
+            </a:solidFill>
+            <a:ln>
+              <a:noFill/>
+            </a:ln>
+            <a:effectLst/>
+          </p:spPr>
+          <p:style>
+            <a:lnRef idx="1">
+              <a:schemeClr val="accent1"/>
+            </a:lnRef>
+            <a:fillRef idx="3">
+              <a:schemeClr val="accent1"/>
+            </a:fillRef>
+            <a:effectRef idx="2">
+              <a:schemeClr val="accent1"/>
+            </a:effectRef>
+            <a:fontRef idx="minor">
+              <a:schemeClr val="lt1"/>
+            </a:fontRef>
+          </p:style>
+          <p:txBody>
+            <a:bodyPr rtlCol="0" anchor="ctr"/>
+            <a:lstStyle/>
+            <a:p>
+              <a:pPr algn="ctr"/>
+              <a:endParaRPr lang="en-US"/>
+            </a:p>
+          </p:txBody>
+        </p:sp>
+        <p:sp>
+          <p:nvSpPr>
+            <p:cNvPr id="86" name="Right Triangle 85"/>
+            <p:cNvSpPr/>
+            <p:nvPr/>
+          </p:nvSpPr>
+          <p:spPr>
+            <a:xfrm flipH="1">
+              <a:off x="4139525" y="4168240"/>
+              <a:ext cx="439163" cy="379490"/>
+            </a:xfrm>
+            <a:prstGeom prst="rtTriangle">
+              <a:avLst/>
+            </a:prstGeom>
+            <a:solidFill>
+              <a:schemeClr val="accent1">
+                <a:lumMod val="50000"/>
+              </a:schemeClr>
+            </a:solidFill>
+            <a:ln>
+              <a:noFill/>
+            </a:ln>
+            <a:effectLst/>
+          </p:spPr>
+          <p:style>
+            <a:lnRef idx="1">
+              <a:schemeClr val="accent1"/>
+            </a:lnRef>
+            <a:fillRef idx="3">
+              <a:schemeClr val="accent1"/>
+            </a:fillRef>
+            <a:effectRef idx="2">
+              <a:schemeClr val="accent1"/>
+            </a:effectRef>
+            <a:fontRef idx="minor">
+              <a:schemeClr val="lt1"/>
+            </a:fontRef>
+          </p:style>
+          <p:txBody>
+            <a:bodyPr rtlCol="0" anchor="ctr"/>
+            <a:lstStyle/>
+            <a:p>
+              <a:pPr algn="ctr"/>
+              <a:endParaRPr lang="en-US"/>
+            </a:p>
+          </p:txBody>
+        </p:sp>
+        <p:sp>
+          <p:nvSpPr>
+            <p:cNvPr id="87" name="Right Triangle 86"/>
+            <p:cNvSpPr/>
+            <p:nvPr/>
+          </p:nvSpPr>
+          <p:spPr>
+            <a:xfrm rot="1440107">
+              <a:off x="5026292" y="3602211"/>
+              <a:ext cx="800180" cy="811575"/>
+            </a:xfrm>
+            <a:prstGeom prst="rtTriangle">
+              <a:avLst/>
+            </a:prstGeom>
+            <a:solidFill>
+              <a:schemeClr val="tx2">
+                <a:lumMod val="50000"/>
+              </a:schemeClr>
+            </a:solidFill>
+            <a:ln>
+              <a:noFill/>
+            </a:ln>
+            <a:effectLst/>
+          </p:spPr>
+          <p:style>
+            <a:lnRef idx="1">
+              <a:schemeClr val="accent1"/>
+            </a:lnRef>
+            <a:fillRef idx="3">
+              <a:schemeClr val="accent1"/>
+            </a:fillRef>
+            <a:effectRef idx="2">
+              <a:schemeClr val="accent1"/>
+            </a:effectRef>
+            <a:fontRef idx="minor">
+              <a:schemeClr val="lt1"/>
+            </a:fontRef>
+          </p:style>
+          <p:txBody>
+            <a:bodyPr rtlCol="0" anchor="ctr"/>
+            <a:lstStyle/>
+            <a:p>
+              <a:pPr algn="ctr"/>
+              <a:endParaRPr lang="en-US"/>
+            </a:p>
+          </p:txBody>
+        </p:sp>
+        <p:sp>
+          <p:nvSpPr>
+            <p:cNvPr id="88" name="Isosceles Triangle 87"/>
+            <p:cNvSpPr/>
+            <p:nvPr/>
+          </p:nvSpPr>
+          <p:spPr>
+            <a:xfrm rot="1945215">
+              <a:off x="5012985" y="2873815"/>
+              <a:ext cx="1044222" cy="740633"/>
+            </a:xfrm>
+            <a:prstGeom prst="triangle">
+              <a:avLst/>
+            </a:prstGeom>
+            <a:solidFill>
+              <a:schemeClr val="tx2">
+                <a:lumMod val="75000"/>
+              </a:schemeClr>
+            </a:solidFill>
+            <a:ln>
+              <a:noFill/>
+            </a:ln>
+            <a:effectLst/>
+          </p:spPr>
+          <p:style>
+            <a:lnRef idx="1">
+              <a:schemeClr val="accent1"/>
+            </a:lnRef>
+            <a:fillRef idx="3">
+              <a:schemeClr val="accent1"/>
+            </a:fillRef>
+            <a:effectRef idx="2">
+              <a:schemeClr val="accent1"/>
+            </a:effectRef>
+            <a:fontRef idx="minor">
+              <a:schemeClr val="lt1"/>
+            </a:fontRef>
+          </p:style>
+          <p:txBody>
+            <a:bodyPr rtlCol="0" anchor="ctr"/>
+            <a:lstStyle/>
+            <a:p>
+              <a:pPr algn="ctr"/>
+              <a:endParaRPr lang="en-US"/>
+            </a:p>
+          </p:txBody>
+        </p:sp>
+        <p:sp>
+          <p:nvSpPr>
+            <p:cNvPr id="89" name="Isosceles Triangle 88"/>
+            <p:cNvSpPr/>
+            <p:nvPr/>
+          </p:nvSpPr>
+          <p:spPr>
+            <a:xfrm rot="3867000">
+              <a:off x="5167836" y="2220088"/>
+              <a:ext cx="585363" cy="971967"/>
+            </a:xfrm>
+            <a:prstGeom prst="triangle">
+              <a:avLst/>
+            </a:prstGeom>
+            <a:solidFill>
+              <a:schemeClr val="tx2">
+                <a:lumMod val="60000"/>
+                <a:lumOff val="40000"/>
+              </a:schemeClr>
+            </a:solidFill>
+            <a:ln>
+              <a:noFill/>
+            </a:ln>
+            <a:effectLst/>
+          </p:spPr>
+          <p:style>
+            <a:lnRef idx="1">
+              <a:schemeClr val="accent1"/>
+            </a:lnRef>
+            <a:fillRef idx="3">
+              <a:schemeClr val="accent1"/>
+            </a:fillRef>
+            <a:effectRef idx="2">
+              <a:schemeClr val="accent1"/>
+            </a:effectRef>
+            <a:fontRef idx="minor">
+              <a:schemeClr val="lt1"/>
+            </a:fontRef>
+          </p:style>
+          <p:txBody>
+            <a:bodyPr rtlCol="0" anchor="ctr"/>
+            <a:lstStyle/>
+            <a:p>
+              <a:pPr algn="ctr"/>
+              <a:endParaRPr lang="en-US"/>
+            </a:p>
+          </p:txBody>
+        </p:sp>
+        <p:sp>
+          <p:nvSpPr>
+            <p:cNvPr id="90" name="Right Triangle 89"/>
+            <p:cNvSpPr/>
+            <p:nvPr/>
+          </p:nvSpPr>
+          <p:spPr>
+            <a:xfrm rot="20725757" flipH="1">
+              <a:off x="5400321" y="3156589"/>
+              <a:ext cx="938424" cy="1073302"/>
+            </a:xfrm>
+            <a:prstGeom prst="rtTriangle">
+              <a:avLst/>
+            </a:prstGeom>
+            <a:solidFill>
+              <a:schemeClr val="accent1">
+                <a:lumMod val="75000"/>
+              </a:schemeClr>
+            </a:solidFill>
+            <a:ln>
+              <a:noFill/>
+            </a:ln>
+            <a:effectLst/>
+          </p:spPr>
+          <p:style>
+            <a:lnRef idx="1">
+              <a:schemeClr val="accent1"/>
+            </a:lnRef>
+            <a:fillRef idx="3">
+              <a:schemeClr val="accent1"/>
+            </a:fillRef>
+            <a:effectRef idx="2">
+              <a:schemeClr val="accent1"/>
+            </a:effectRef>
+            <a:fontRef idx="minor">
+              <a:schemeClr val="lt1"/>
+            </a:fontRef>
+          </p:style>
+          <p:txBody>
+            <a:bodyPr rtlCol="0" anchor="ctr"/>
+            <a:lstStyle/>
+            <a:p>
+              <a:pPr algn="ctr"/>
+              <a:endParaRPr lang="en-US"/>
+            </a:p>
+          </p:txBody>
+        </p:sp>
+        <p:sp>
+          <p:nvSpPr>
+            <p:cNvPr id="91" name="Isosceles Triangle 90"/>
+            <p:cNvSpPr/>
+            <p:nvPr/>
+          </p:nvSpPr>
+          <p:spPr>
+            <a:xfrm rot="2208847" flipH="1" flipV="1">
+              <a:off x="5538655" y="2503493"/>
+              <a:ext cx="916387" cy="834311"/>
+            </a:xfrm>
+            <a:prstGeom prst="triangle">
+              <a:avLst/>
+            </a:prstGeom>
+            <a:solidFill>
+              <a:schemeClr val="accent1">
+                <a:lumMod val="60000"/>
+                <a:lumOff val="40000"/>
+              </a:schemeClr>
+            </a:solidFill>
+            <a:ln>
+              <a:noFill/>
+            </a:ln>
+            <a:effectLst/>
+          </p:spPr>
+          <p:style>
+            <a:lnRef idx="1">
+              <a:schemeClr val="accent1"/>
+            </a:lnRef>
+            <a:fillRef idx="3">
+              <a:schemeClr val="accent1"/>
+            </a:fillRef>
+            <a:effectRef idx="2">
+              <a:schemeClr val="accent1"/>
+            </a:effectRef>
+            <a:fontRef idx="minor">
+              <a:schemeClr val="lt1"/>
+            </a:fontRef>
+          </p:style>
+          <p:txBody>
+            <a:bodyPr rtlCol="0" anchor="ctr"/>
+            <a:lstStyle/>
+            <a:p>
+              <a:pPr algn="ctr"/>
+              <a:endParaRPr lang="en-US"/>
+            </a:p>
+          </p:txBody>
+        </p:sp>
+        <p:sp>
+          <p:nvSpPr>
+            <p:cNvPr id="92" name="Right Triangle 91"/>
+            <p:cNvSpPr/>
+            <p:nvPr/>
+          </p:nvSpPr>
+          <p:spPr>
+            <a:xfrm flipH="1">
+              <a:off x="5746638" y="4168239"/>
+              <a:ext cx="439163" cy="379490"/>
+            </a:xfrm>
+            <a:prstGeom prst="rtTriangle">
+              <a:avLst/>
+            </a:prstGeom>
+            <a:solidFill>
+              <a:schemeClr val="accent1">
+                <a:lumMod val="50000"/>
+              </a:schemeClr>
+            </a:solidFill>
+            <a:ln>
+              <a:noFill/>
+            </a:ln>
+            <a:effectLst/>
+          </p:spPr>
+          <p:style>
+            <a:lnRef idx="1">
+              <a:schemeClr val="accent1"/>
+            </a:lnRef>
+            <a:fillRef idx="3">
+              <a:schemeClr val="accent1"/>
+            </a:fillRef>
+            <a:effectRef idx="2">
+              <a:schemeClr val="accent1"/>
+            </a:effectRef>
+            <a:fontRef idx="minor">
+              <a:schemeClr val="lt1"/>
+            </a:fontRef>
+          </p:style>
+          <p:txBody>
+            <a:bodyPr rtlCol="0" anchor="ctr"/>
+            <a:lstStyle/>
+            <a:p>
+              <a:pPr algn="ctr"/>
+              <a:endParaRPr lang="en-US"/>
+            </a:p>
+          </p:txBody>
+        </p:sp>
+        <p:sp>
+          <p:nvSpPr>
+            <p:cNvPr id="93" name="Right Triangle 92"/>
+            <p:cNvSpPr/>
+            <p:nvPr/>
+          </p:nvSpPr>
+          <p:spPr>
+            <a:xfrm rot="1440107">
+              <a:off x="201804" y="1366603"/>
+              <a:ext cx="800180" cy="811575"/>
+            </a:xfrm>
+            <a:prstGeom prst="rtTriangle">
+              <a:avLst/>
+            </a:prstGeom>
+            <a:solidFill>
+              <a:schemeClr val="tx2">
+                <a:lumMod val="50000"/>
+              </a:schemeClr>
+            </a:solidFill>
+            <a:ln>
+              <a:noFill/>
+            </a:ln>
+            <a:effectLst/>
+          </p:spPr>
+          <p:style>
+            <a:lnRef idx="1">
+              <a:schemeClr val="accent1"/>
+            </a:lnRef>
+            <a:fillRef idx="3">
+              <a:schemeClr val="accent1"/>
+            </a:fillRef>
+            <a:effectRef idx="2">
+              <a:schemeClr val="accent1"/>
+            </a:effectRef>
+            <a:fontRef idx="minor">
+              <a:schemeClr val="lt1"/>
+            </a:fontRef>
+          </p:style>
+          <p:txBody>
+            <a:bodyPr rtlCol="0" anchor="ctr"/>
+            <a:lstStyle/>
+            <a:p>
+              <a:pPr algn="ctr"/>
+              <a:endParaRPr lang="en-US"/>
+            </a:p>
+          </p:txBody>
+        </p:sp>
+        <p:sp>
+          <p:nvSpPr>
+            <p:cNvPr id="94" name="Isosceles Triangle 93"/>
+            <p:cNvSpPr/>
+            <p:nvPr/>
+          </p:nvSpPr>
+          <p:spPr>
+            <a:xfrm rot="1945215">
+              <a:off x="188497" y="638207"/>
+              <a:ext cx="1044222" cy="740633"/>
+            </a:xfrm>
+            <a:prstGeom prst="triangle">
+              <a:avLst/>
+            </a:prstGeom>
+            <a:solidFill>
+              <a:schemeClr val="tx2">
+                <a:lumMod val="75000"/>
+              </a:schemeClr>
+            </a:solidFill>
+            <a:ln>
+              <a:noFill/>
+            </a:ln>
+            <a:effectLst/>
+          </p:spPr>
+          <p:style>
+            <a:lnRef idx="1">
+              <a:schemeClr val="accent1"/>
+            </a:lnRef>
+            <a:fillRef idx="3">
+              <a:schemeClr val="accent1"/>
+            </a:fillRef>
+            <a:effectRef idx="2">
+              <a:schemeClr val="accent1"/>
+            </a:effectRef>
+            <a:fontRef idx="minor">
+              <a:schemeClr val="lt1"/>
+            </a:fontRef>
+          </p:style>
+          <p:txBody>
+            <a:bodyPr rtlCol="0" anchor="ctr"/>
+            <a:lstStyle/>
+            <a:p>
+              <a:pPr algn="ctr"/>
+              <a:endParaRPr lang="en-US"/>
+            </a:p>
+          </p:txBody>
+        </p:sp>
+        <p:sp>
+          <p:nvSpPr>
+            <p:cNvPr id="95" name="Isosceles Triangle 94"/>
+            <p:cNvSpPr/>
+            <p:nvPr/>
+          </p:nvSpPr>
+          <p:spPr>
+            <a:xfrm rot="3867000">
+              <a:off x="343348" y="-15520"/>
+              <a:ext cx="585363" cy="971967"/>
+            </a:xfrm>
+            <a:prstGeom prst="triangle">
+              <a:avLst/>
+            </a:prstGeom>
+            <a:solidFill>
+              <a:schemeClr val="tx2">
+                <a:lumMod val="60000"/>
+                <a:lumOff val="40000"/>
+              </a:schemeClr>
+            </a:solidFill>
+            <a:ln>
+              <a:noFill/>
+            </a:ln>
+            <a:effectLst/>
+          </p:spPr>
+          <p:style>
+            <a:lnRef idx="1">
+              <a:schemeClr val="accent1"/>
+            </a:lnRef>
+            <a:fillRef idx="3">
+              <a:schemeClr val="accent1"/>
+            </a:fillRef>
+            <a:effectRef idx="2">
+              <a:schemeClr val="accent1"/>
+            </a:effectRef>
+            <a:fontRef idx="minor">
+              <a:schemeClr val="lt1"/>
+            </a:fontRef>
+          </p:style>
+          <p:txBody>
+            <a:bodyPr rtlCol="0" anchor="ctr"/>
+            <a:lstStyle/>
+            <a:p>
+              <a:pPr algn="ctr"/>
+              <a:endParaRPr lang="en-US"/>
+            </a:p>
+          </p:txBody>
+        </p:sp>
+        <p:sp>
+          <p:nvSpPr>
+            <p:cNvPr id="96" name="Right Triangle 95"/>
+            <p:cNvSpPr/>
+            <p:nvPr/>
+          </p:nvSpPr>
+          <p:spPr>
+            <a:xfrm rot="20725757" flipH="1">
+              <a:off x="575833" y="920981"/>
+              <a:ext cx="938424" cy="1073302"/>
+            </a:xfrm>
+            <a:prstGeom prst="rtTriangle">
+              <a:avLst/>
+            </a:prstGeom>
+            <a:solidFill>
+              <a:schemeClr val="accent1">
+                <a:lumMod val="75000"/>
+              </a:schemeClr>
+            </a:solidFill>
+            <a:ln>
+              <a:noFill/>
+            </a:ln>
+            <a:effectLst/>
+          </p:spPr>
+          <p:style>
+            <a:lnRef idx="1">
+              <a:schemeClr val="accent1"/>
+            </a:lnRef>
+            <a:fillRef idx="3">
+              <a:schemeClr val="accent1"/>
+            </a:fillRef>
+            <a:effectRef idx="2">
+              <a:schemeClr val="accent1"/>
+            </a:effectRef>
+            <a:fontRef idx="minor">
+              <a:schemeClr val="lt1"/>
+            </a:fontRef>
+          </p:style>
+          <p:txBody>
+            <a:bodyPr rtlCol="0" anchor="ctr"/>
+            <a:lstStyle/>
+            <a:p>
+              <a:pPr algn="ctr"/>
+              <a:endParaRPr lang="en-US"/>
+            </a:p>
+          </p:txBody>
+        </p:sp>
+        <p:sp>
+          <p:nvSpPr>
+            <p:cNvPr id="97" name="Isosceles Triangle 96"/>
+            <p:cNvSpPr/>
+            <p:nvPr/>
+          </p:nvSpPr>
+          <p:spPr>
+            <a:xfrm rot="2208847" flipH="1" flipV="1">
+              <a:off x="714167" y="267885"/>
+              <a:ext cx="916387" cy="834311"/>
+            </a:xfrm>
+            <a:prstGeom prst="triangle">
+              <a:avLst/>
+            </a:prstGeom>
+            <a:solidFill>
+              <a:schemeClr val="accent1">
+                <a:lumMod val="60000"/>
+                <a:lumOff val="40000"/>
+              </a:schemeClr>
+            </a:solidFill>
+            <a:ln>
+              <a:noFill/>
+            </a:ln>
+            <a:effectLst/>
+          </p:spPr>
+          <p:style>
+            <a:lnRef idx="1">
+              <a:schemeClr val="accent1"/>
+            </a:lnRef>
+            <a:fillRef idx="3">
+              <a:schemeClr val="accent1"/>
+            </a:fillRef>
+            <a:effectRef idx="2">
+              <a:schemeClr val="accent1"/>
+            </a:effectRef>
+            <a:fontRef idx="minor">
+              <a:schemeClr val="lt1"/>
+            </a:fontRef>
+          </p:style>
+          <p:txBody>
+            <a:bodyPr rtlCol="0" anchor="ctr"/>
+            <a:lstStyle/>
+            <a:p>
+              <a:pPr algn="ctr"/>
+              <a:endParaRPr lang="en-US"/>
+            </a:p>
+          </p:txBody>
+        </p:sp>
+        <p:sp>
+          <p:nvSpPr>
+            <p:cNvPr id="98" name="Right Triangle 97"/>
+            <p:cNvSpPr/>
+            <p:nvPr/>
+          </p:nvSpPr>
+          <p:spPr>
+            <a:xfrm flipH="1">
+              <a:off x="922150" y="1932631"/>
+              <a:ext cx="439163" cy="379490"/>
+            </a:xfrm>
+            <a:prstGeom prst="rtTriangle">
+              <a:avLst/>
+            </a:prstGeom>
+            <a:solidFill>
+              <a:schemeClr val="accent1">
+                <a:lumMod val="50000"/>
+              </a:schemeClr>
+            </a:solidFill>
+            <a:ln>
+              <a:noFill/>
+            </a:ln>
+            <a:effectLst/>
+          </p:spPr>
+          <p:style>
+            <a:lnRef idx="1">
+              <a:schemeClr val="accent1"/>
+            </a:lnRef>
+            <a:fillRef idx="3">
+              <a:schemeClr val="accent1"/>
+            </a:fillRef>
+            <a:effectRef idx="2">
+              <a:schemeClr val="accent1"/>
+            </a:effectRef>
+            <a:fontRef idx="minor">
+              <a:schemeClr val="lt1"/>
+            </a:fontRef>
+          </p:style>
+          <p:txBody>
+            <a:bodyPr rtlCol="0" anchor="ctr"/>
+            <a:lstStyle/>
+            <a:p>
+              <a:pPr algn="ctr"/>
+              <a:endParaRPr lang="en-US"/>
+            </a:p>
+          </p:txBody>
+        </p:sp>
+        <p:sp>
+          <p:nvSpPr>
+            <p:cNvPr id="99" name="Right Triangle 98"/>
+            <p:cNvSpPr/>
+            <p:nvPr/>
+          </p:nvSpPr>
+          <p:spPr>
+            <a:xfrm rot="1440107">
+              <a:off x="1808917" y="1366602"/>
+              <a:ext cx="800180" cy="811575"/>
+            </a:xfrm>
+            <a:prstGeom prst="rtTriangle">
+              <a:avLst/>
+            </a:prstGeom>
+            <a:solidFill>
+              <a:schemeClr val="tx2">
+                <a:lumMod val="50000"/>
+              </a:schemeClr>
+            </a:solidFill>
+            <a:ln>
+              <a:noFill/>
+            </a:ln>
+            <a:effectLst/>
+          </p:spPr>
+          <p:style>
+            <a:lnRef idx="1">
+              <a:schemeClr val="accent1"/>
+            </a:lnRef>
+            <a:fillRef idx="3">
+              <a:schemeClr val="accent1"/>
+            </a:fillRef>
+            <a:effectRef idx="2">
+              <a:schemeClr val="accent1"/>
+            </a:effectRef>
+            <a:fontRef idx="minor">
+              <a:schemeClr val="lt1"/>
+            </a:fontRef>
+          </p:style>
+          <p:txBody>
+            <a:bodyPr rtlCol="0" anchor="ctr"/>
+            <a:lstStyle/>
+            <a:p>
+              <a:pPr algn="ctr"/>
+              <a:endParaRPr lang="en-US"/>
+            </a:p>
+          </p:txBody>
+        </p:sp>
+        <p:sp>
+          <p:nvSpPr>
+            <p:cNvPr id="100" name="Isosceles Triangle 99"/>
+            <p:cNvSpPr/>
+            <p:nvPr/>
+          </p:nvSpPr>
+          <p:spPr>
+            <a:xfrm rot="1945215">
+              <a:off x="1795610" y="638206"/>
+              <a:ext cx="1044222" cy="740633"/>
+            </a:xfrm>
+            <a:prstGeom prst="triangle">
+              <a:avLst/>
+            </a:prstGeom>
+            <a:solidFill>
+              <a:schemeClr val="tx2">
+                <a:lumMod val="75000"/>
+              </a:schemeClr>
+            </a:solidFill>
+            <a:ln>
+              <a:noFill/>
+            </a:ln>
+            <a:effectLst/>
+          </p:spPr>
+          <p:style>
+            <a:lnRef idx="1">
+              <a:schemeClr val="accent1"/>
+            </a:lnRef>
+            <a:fillRef idx="3">
+              <a:schemeClr val="accent1"/>
+            </a:fillRef>
+            <a:effectRef idx="2">
+              <a:schemeClr val="accent1"/>
+            </a:effectRef>
+            <a:fontRef idx="minor">
+              <a:schemeClr val="lt1"/>
+            </a:fontRef>
+          </p:style>
+          <p:txBody>
+            <a:bodyPr rtlCol="0" anchor="ctr"/>
+            <a:lstStyle/>
+            <a:p>
+              <a:pPr algn="ctr"/>
+              <a:endParaRPr lang="en-US"/>
+            </a:p>
+          </p:txBody>
+        </p:sp>
+        <p:sp>
+          <p:nvSpPr>
+            <p:cNvPr id="101" name="Isosceles Triangle 100"/>
+            <p:cNvSpPr/>
+            <p:nvPr/>
+          </p:nvSpPr>
+          <p:spPr>
+            <a:xfrm rot="3867000">
+              <a:off x="1950461" y="-15521"/>
+              <a:ext cx="585363" cy="971967"/>
+            </a:xfrm>
+            <a:prstGeom prst="triangle">
+              <a:avLst/>
+            </a:prstGeom>
+            <a:solidFill>
+              <a:schemeClr val="tx2">
+                <a:lumMod val="60000"/>
+                <a:lumOff val="40000"/>
+              </a:schemeClr>
+            </a:solidFill>
+            <a:ln>
+              <a:noFill/>
+            </a:ln>
+            <a:effectLst/>
+          </p:spPr>
+          <p:style>
+            <a:lnRef idx="1">
+              <a:schemeClr val="accent1"/>
+            </a:lnRef>
+            <a:fillRef idx="3">
+              <a:schemeClr val="accent1"/>
+            </a:fillRef>
+            <a:effectRef idx="2">
+              <a:schemeClr val="accent1"/>
+            </a:effectRef>
+            <a:fontRef idx="minor">
+              <a:schemeClr val="lt1"/>
+            </a:fontRef>
+          </p:style>
+          <p:txBody>
+            <a:bodyPr rtlCol="0" anchor="ctr"/>
+            <a:lstStyle/>
+            <a:p>
+              <a:pPr algn="ctr"/>
+              <a:endParaRPr lang="en-US"/>
+            </a:p>
+          </p:txBody>
+        </p:sp>
+        <p:sp>
+          <p:nvSpPr>
+            <p:cNvPr id="102" name="Right Triangle 101"/>
+            <p:cNvSpPr/>
+            <p:nvPr/>
+          </p:nvSpPr>
+          <p:spPr>
+            <a:xfrm rot="20725757" flipH="1">
+              <a:off x="2182946" y="920980"/>
+              <a:ext cx="938424" cy="1073302"/>
+            </a:xfrm>
+            <a:prstGeom prst="rtTriangle">
+              <a:avLst/>
+            </a:prstGeom>
+            <a:solidFill>
+              <a:schemeClr val="accent1">
+                <a:lumMod val="75000"/>
+              </a:schemeClr>
+            </a:solidFill>
+            <a:ln>
+              <a:noFill/>
+            </a:ln>
+            <a:effectLst/>
+          </p:spPr>
+          <p:style>
+            <a:lnRef idx="1">
+              <a:schemeClr val="accent1"/>
+            </a:lnRef>
+            <a:fillRef idx="3">
+              <a:schemeClr val="accent1"/>
+            </a:fillRef>
+            <a:effectRef idx="2">
+              <a:schemeClr val="accent1"/>
+            </a:effectRef>
+            <a:fontRef idx="minor">
+              <a:schemeClr val="lt1"/>
+            </a:fontRef>
+          </p:style>
+          <p:txBody>
+            <a:bodyPr rtlCol="0" anchor="ctr"/>
+            <a:lstStyle/>
+            <a:p>
+              <a:pPr algn="ctr"/>
+              <a:endParaRPr lang="en-US"/>
+            </a:p>
+          </p:txBody>
+        </p:sp>
+        <p:sp>
+          <p:nvSpPr>
+            <p:cNvPr id="103" name="Isosceles Triangle 102"/>
+            <p:cNvSpPr/>
+            <p:nvPr/>
+          </p:nvSpPr>
+          <p:spPr>
+            <a:xfrm rot="2208847" flipH="1" flipV="1">
+              <a:off x="2321280" y="267884"/>
+              <a:ext cx="916387" cy="834311"/>
+            </a:xfrm>
+            <a:prstGeom prst="triangle">
+              <a:avLst/>
+            </a:prstGeom>
+            <a:solidFill>
+              <a:schemeClr val="accent1">
+                <a:lumMod val="60000"/>
+                <a:lumOff val="40000"/>
+              </a:schemeClr>
+            </a:solidFill>
+            <a:ln>
+              <a:noFill/>
+            </a:ln>
+            <a:effectLst/>
+          </p:spPr>
+          <p:style>
+            <a:lnRef idx="1">
+              <a:schemeClr val="accent1"/>
+            </a:lnRef>
+            <a:fillRef idx="3">
+              <a:schemeClr val="accent1"/>
+            </a:fillRef>
+            <a:effectRef idx="2">
+              <a:schemeClr val="accent1"/>
+            </a:effectRef>
+            <a:fontRef idx="minor">
+              <a:schemeClr val="lt1"/>
+            </a:fontRef>
+          </p:style>
+          <p:txBody>
+            <a:bodyPr rtlCol="0" anchor="ctr"/>
+            <a:lstStyle/>
+            <a:p>
+              <a:pPr algn="ctr"/>
+              <a:endParaRPr lang="en-US"/>
+            </a:p>
+          </p:txBody>
+        </p:sp>
+        <p:sp>
+          <p:nvSpPr>
+            <p:cNvPr id="104" name="Right Triangle 103"/>
+            <p:cNvSpPr/>
+            <p:nvPr/>
+          </p:nvSpPr>
+          <p:spPr>
+            <a:xfrm flipH="1">
+              <a:off x="2529263" y="1932630"/>
+              <a:ext cx="439163" cy="379490"/>
+            </a:xfrm>
+            <a:prstGeom prst="rtTriangle">
+              <a:avLst/>
+            </a:prstGeom>
+            <a:solidFill>
+              <a:schemeClr val="accent1">
+                <a:lumMod val="50000"/>
+              </a:schemeClr>
+            </a:solidFill>
+            <a:ln>
+              <a:noFill/>
+            </a:ln>
+            <a:effectLst/>
+          </p:spPr>
+          <p:style>
+            <a:lnRef idx="1">
+              <a:schemeClr val="accent1"/>
+            </a:lnRef>
+            <a:fillRef idx="3">
+              <a:schemeClr val="accent1"/>
+            </a:fillRef>
+            <a:effectRef idx="2">
+              <a:schemeClr val="accent1"/>
+            </a:effectRef>
+            <a:fontRef idx="minor">
+              <a:schemeClr val="lt1"/>
+            </a:fontRef>
+          </p:style>
+          <p:txBody>
+            <a:bodyPr rtlCol="0" anchor="ctr"/>
+            <a:lstStyle/>
+            <a:p>
+              <a:pPr algn="ctr"/>
+              <a:endParaRPr lang="en-US"/>
+            </a:p>
+          </p:txBody>
+        </p:sp>
+        <p:sp>
+          <p:nvSpPr>
+            <p:cNvPr id="105" name="Right Triangle 104"/>
+            <p:cNvSpPr/>
+            <p:nvPr/>
+          </p:nvSpPr>
+          <p:spPr>
+            <a:xfrm rot="1440107">
+              <a:off x="3421921" y="1366604"/>
+              <a:ext cx="800180" cy="811575"/>
+            </a:xfrm>
+            <a:prstGeom prst="rtTriangle">
+              <a:avLst/>
+            </a:prstGeom>
+            <a:solidFill>
+              <a:schemeClr val="tx2">
+                <a:lumMod val="50000"/>
+              </a:schemeClr>
+            </a:solidFill>
+            <a:ln>
+              <a:noFill/>
+            </a:ln>
+            <a:effectLst/>
+          </p:spPr>
+          <p:style>
+            <a:lnRef idx="1">
+              <a:schemeClr val="accent1"/>
+            </a:lnRef>
+            <a:fillRef idx="3">
+              <a:schemeClr val="accent1"/>
+            </a:fillRef>
+            <a:effectRef idx="2">
+              <a:schemeClr val="accent1"/>
+            </a:effectRef>
+            <a:fontRef idx="minor">
+              <a:schemeClr val="lt1"/>
+            </a:fontRef>
+          </p:style>
+          <p:txBody>
+            <a:bodyPr rtlCol="0" anchor="ctr"/>
+            <a:lstStyle/>
+            <a:p>
+              <a:pPr algn="ctr"/>
+              <a:endParaRPr lang="en-US"/>
+            </a:p>
+          </p:txBody>
+        </p:sp>
+        <p:sp>
+          <p:nvSpPr>
+            <p:cNvPr id="106" name="Isosceles Triangle 105"/>
+            <p:cNvSpPr/>
+            <p:nvPr/>
+          </p:nvSpPr>
+          <p:spPr>
+            <a:xfrm rot="1945215">
+              <a:off x="3408614" y="638208"/>
+              <a:ext cx="1044222" cy="740633"/>
+            </a:xfrm>
+            <a:prstGeom prst="triangle">
+              <a:avLst/>
+            </a:prstGeom>
+            <a:solidFill>
+              <a:schemeClr val="tx2">
+                <a:lumMod val="75000"/>
+              </a:schemeClr>
+            </a:solidFill>
+            <a:ln>
+              <a:noFill/>
+            </a:ln>
+            <a:effectLst/>
+          </p:spPr>
+          <p:style>
+            <a:lnRef idx="1">
+              <a:schemeClr val="accent1"/>
+            </a:lnRef>
+            <a:fillRef idx="3">
+              <a:schemeClr val="accent1"/>
+            </a:fillRef>
+            <a:effectRef idx="2">
+              <a:schemeClr val="accent1"/>
+            </a:effectRef>
+            <a:fontRef idx="minor">
+              <a:schemeClr val="lt1"/>
+            </a:fontRef>
+          </p:style>
+          <p:txBody>
+            <a:bodyPr rtlCol="0" anchor="ctr"/>
+            <a:lstStyle/>
+            <a:p>
+              <a:pPr algn="ctr"/>
+              <a:endParaRPr lang="en-US"/>
+            </a:p>
+          </p:txBody>
+        </p:sp>
+        <p:sp>
+          <p:nvSpPr>
+            <p:cNvPr id="107" name="Isosceles Triangle 106"/>
+            <p:cNvSpPr/>
+            <p:nvPr/>
+          </p:nvSpPr>
+          <p:spPr>
+            <a:xfrm rot="3867000">
+              <a:off x="3563465" y="-15519"/>
+              <a:ext cx="585363" cy="971967"/>
+            </a:xfrm>
+            <a:prstGeom prst="triangle">
+              <a:avLst/>
+            </a:prstGeom>
+            <a:solidFill>
+              <a:schemeClr val="tx2">
+                <a:lumMod val="60000"/>
+                <a:lumOff val="40000"/>
+              </a:schemeClr>
+            </a:solidFill>
+            <a:ln>
+              <a:noFill/>
+            </a:ln>
+            <a:effectLst/>
+          </p:spPr>
+          <p:style>
+            <a:lnRef idx="1">
+              <a:schemeClr val="accent1"/>
+            </a:lnRef>
+            <a:fillRef idx="3">
+              <a:schemeClr val="accent1"/>
+            </a:fillRef>
+            <a:effectRef idx="2">
+              <a:schemeClr val="accent1"/>
+            </a:effectRef>
+            <a:fontRef idx="minor">
+              <a:schemeClr val="lt1"/>
+            </a:fontRef>
+          </p:style>
+          <p:txBody>
+            <a:bodyPr rtlCol="0" anchor="ctr"/>
+            <a:lstStyle/>
+            <a:p>
+              <a:pPr algn="ctr"/>
+              <a:endParaRPr lang="en-US"/>
+            </a:p>
+          </p:txBody>
+        </p:sp>
+        <p:sp>
+          <p:nvSpPr>
+            <p:cNvPr id="108" name="Right Triangle 107"/>
+            <p:cNvSpPr/>
+            <p:nvPr/>
+          </p:nvSpPr>
+          <p:spPr>
+            <a:xfrm rot="20725757" flipH="1">
+              <a:off x="3795950" y="920982"/>
+              <a:ext cx="938424" cy="1073302"/>
+            </a:xfrm>
+            <a:prstGeom prst="rtTriangle">
+              <a:avLst/>
+            </a:prstGeom>
+            <a:solidFill>
+              <a:schemeClr val="accent1">
+                <a:lumMod val="75000"/>
+              </a:schemeClr>
+            </a:solidFill>
+            <a:ln>
+              <a:noFill/>
+            </a:ln>
+            <a:effectLst/>
+          </p:spPr>
+          <p:style>
+            <a:lnRef idx="1">
+              <a:schemeClr val="accent1"/>
+            </a:lnRef>
+            <a:fillRef idx="3">
+              <a:schemeClr val="accent1"/>
+            </a:fillRef>
+            <a:effectRef idx="2">
+              <a:schemeClr val="accent1"/>
+            </a:effectRef>
+            <a:fontRef idx="minor">
+              <a:schemeClr val="lt1"/>
+            </a:fontRef>
+          </p:style>
+          <p:txBody>
+            <a:bodyPr rtlCol="0" anchor="ctr"/>
+            <a:lstStyle/>
+            <a:p>
+              <a:pPr algn="ctr"/>
+              <a:endParaRPr lang="en-US"/>
+            </a:p>
+          </p:txBody>
+        </p:sp>
+        <p:sp>
+          <p:nvSpPr>
+            <p:cNvPr id="109" name="Isosceles Triangle 108"/>
+            <p:cNvSpPr/>
+            <p:nvPr/>
+          </p:nvSpPr>
+          <p:spPr>
+            <a:xfrm rot="2208847" flipH="1" flipV="1">
+              <a:off x="3934284" y="267886"/>
+              <a:ext cx="916387" cy="834311"/>
+            </a:xfrm>
+            <a:prstGeom prst="triangle">
+              <a:avLst/>
+            </a:prstGeom>
+            <a:solidFill>
+              <a:schemeClr val="accent1">
+                <a:lumMod val="60000"/>
+                <a:lumOff val="40000"/>
+              </a:schemeClr>
+            </a:solidFill>
+            <a:ln>
+              <a:noFill/>
+            </a:ln>
+            <a:effectLst/>
+          </p:spPr>
+          <p:style>
+            <a:lnRef idx="1">
+              <a:schemeClr val="accent1"/>
+            </a:lnRef>
+            <a:fillRef idx="3">
+              <a:schemeClr val="accent1"/>
+            </a:fillRef>
+            <a:effectRef idx="2">
+              <a:schemeClr val="accent1"/>
+            </a:effectRef>
+            <a:fontRef idx="minor">
+              <a:schemeClr val="lt1"/>
+            </a:fontRef>
+          </p:style>
+          <p:txBody>
+            <a:bodyPr rtlCol="0" anchor="ctr"/>
+            <a:lstStyle/>
+            <a:p>
+              <a:pPr algn="ctr"/>
+              <a:endParaRPr lang="en-US"/>
+            </a:p>
+          </p:txBody>
+        </p:sp>
+        <p:sp>
+          <p:nvSpPr>
+            <p:cNvPr id="110" name="Right Triangle 109"/>
+            <p:cNvSpPr/>
+            <p:nvPr/>
+          </p:nvSpPr>
+          <p:spPr>
+            <a:xfrm flipH="1">
+              <a:off x="4142267" y="1932632"/>
+              <a:ext cx="439163" cy="379490"/>
+            </a:xfrm>
+            <a:prstGeom prst="rtTriangle">
+              <a:avLst/>
+            </a:prstGeom>
+            <a:solidFill>
+              <a:schemeClr val="accent1">
+                <a:lumMod val="50000"/>
+              </a:schemeClr>
+            </a:solidFill>
+            <a:ln>
+              <a:noFill/>
+            </a:ln>
+            <a:effectLst/>
+          </p:spPr>
+          <p:style>
+            <a:lnRef idx="1">
+              <a:schemeClr val="accent1"/>
+            </a:lnRef>
+            <a:fillRef idx="3">
+              <a:schemeClr val="accent1"/>
+            </a:fillRef>
+            <a:effectRef idx="2">
+              <a:schemeClr val="accent1"/>
+            </a:effectRef>
+            <a:fontRef idx="minor">
+              <a:schemeClr val="lt1"/>
+            </a:fontRef>
+          </p:style>
+          <p:txBody>
+            <a:bodyPr rtlCol="0" anchor="ctr"/>
+            <a:lstStyle/>
+            <a:p>
+              <a:pPr algn="ctr"/>
+              <a:endParaRPr lang="en-US"/>
+            </a:p>
+          </p:txBody>
+        </p:sp>
+        <p:sp>
+          <p:nvSpPr>
+            <p:cNvPr id="111" name="Right Triangle 110"/>
+            <p:cNvSpPr/>
+            <p:nvPr/>
+          </p:nvSpPr>
+          <p:spPr>
+            <a:xfrm rot="1440107">
+              <a:off x="5029034" y="1366603"/>
+              <a:ext cx="800180" cy="811575"/>
+            </a:xfrm>
+            <a:prstGeom prst="rtTriangle">
+              <a:avLst/>
+            </a:prstGeom>
+            <a:solidFill>
+              <a:schemeClr val="tx2">
+                <a:lumMod val="50000"/>
+              </a:schemeClr>
+            </a:solidFill>
+            <a:ln>
+              <a:noFill/>
+            </a:ln>
+            <a:effectLst/>
+          </p:spPr>
+          <p:style>
+            <a:lnRef idx="1">
+              <a:schemeClr val="accent1"/>
+            </a:lnRef>
+            <a:fillRef idx="3">
+              <a:schemeClr val="accent1"/>
+            </a:fillRef>
+            <a:effectRef idx="2">
+              <a:schemeClr val="accent1"/>
+            </a:effectRef>
+            <a:fontRef idx="minor">
+              <a:schemeClr val="lt1"/>
+            </a:fontRef>
+          </p:style>
+          <p:txBody>
+            <a:bodyPr rtlCol="0" anchor="ctr"/>
+            <a:lstStyle/>
+            <a:p>
+              <a:pPr algn="ctr"/>
+              <a:endParaRPr lang="en-US"/>
+            </a:p>
+          </p:txBody>
+        </p:sp>
+        <p:sp>
+          <p:nvSpPr>
+            <p:cNvPr id="112" name="Isosceles Triangle 111"/>
+            <p:cNvSpPr/>
+            <p:nvPr/>
+          </p:nvSpPr>
+          <p:spPr>
+            <a:xfrm rot="1945215">
+              <a:off x="5015727" y="638207"/>
+              <a:ext cx="1044222" cy="740633"/>
+            </a:xfrm>
+            <a:prstGeom prst="triangle">
+              <a:avLst/>
+            </a:prstGeom>
+            <a:solidFill>
+              <a:schemeClr val="tx2">
+                <a:lumMod val="75000"/>
+              </a:schemeClr>
+            </a:solidFill>
+            <a:ln>
+              <a:noFill/>
+            </a:ln>
+            <a:effectLst/>
+          </p:spPr>
+          <p:style>
+            <a:lnRef idx="1">
+              <a:schemeClr val="accent1"/>
+            </a:lnRef>
+            <a:fillRef idx="3">
+              <a:schemeClr val="accent1"/>
+            </a:fillRef>
+            <a:effectRef idx="2">
+              <a:schemeClr val="accent1"/>
+            </a:effectRef>
+            <a:fontRef idx="minor">
+              <a:schemeClr val="lt1"/>
+            </a:fontRef>
+          </p:style>
+          <p:txBody>
+            <a:bodyPr rtlCol="0" anchor="ctr"/>
+            <a:lstStyle/>
+            <a:p>
+              <a:pPr algn="ctr"/>
+              <a:endParaRPr lang="en-US"/>
+            </a:p>
+          </p:txBody>
+        </p:sp>
+        <p:sp>
+          <p:nvSpPr>
+            <p:cNvPr id="113" name="Isosceles Triangle 112"/>
+            <p:cNvSpPr/>
+            <p:nvPr/>
+          </p:nvSpPr>
+          <p:spPr>
+            <a:xfrm rot="3867000">
+              <a:off x="5170578" y="-15520"/>
+              <a:ext cx="585363" cy="971967"/>
+            </a:xfrm>
+            <a:prstGeom prst="triangle">
+              <a:avLst/>
+            </a:prstGeom>
+            <a:solidFill>
+              <a:schemeClr val="tx2">
+                <a:lumMod val="60000"/>
+                <a:lumOff val="40000"/>
+              </a:schemeClr>
+            </a:solidFill>
+            <a:ln>
+              <a:noFill/>
+            </a:ln>
+            <a:effectLst/>
+          </p:spPr>
+          <p:style>
+            <a:lnRef idx="1">
+              <a:schemeClr val="accent1"/>
+            </a:lnRef>
+            <a:fillRef idx="3">
+              <a:schemeClr val="accent1"/>
+            </a:fillRef>
+            <a:effectRef idx="2">
+              <a:schemeClr val="accent1"/>
+            </a:effectRef>
+            <a:fontRef idx="minor">
+              <a:schemeClr val="lt1"/>
+            </a:fontRef>
+          </p:style>
+          <p:txBody>
+            <a:bodyPr rtlCol="0" anchor="ctr"/>
+            <a:lstStyle/>
+            <a:p>
+              <a:pPr algn="ctr"/>
+              <a:endParaRPr lang="en-US"/>
+            </a:p>
+          </p:txBody>
+        </p:sp>
+        <p:sp>
+          <p:nvSpPr>
+            <p:cNvPr id="114" name="Right Triangle 113"/>
+            <p:cNvSpPr/>
+            <p:nvPr/>
+          </p:nvSpPr>
+          <p:spPr>
+            <a:xfrm rot="20725757" flipH="1">
+              <a:off x="5403063" y="920981"/>
+              <a:ext cx="938424" cy="1073302"/>
+            </a:xfrm>
+            <a:prstGeom prst="rtTriangle">
+              <a:avLst/>
+            </a:prstGeom>
+            <a:solidFill>
+              <a:schemeClr val="accent1">
+                <a:lumMod val="75000"/>
+              </a:schemeClr>
+            </a:solidFill>
+            <a:ln>
+              <a:noFill/>
+            </a:ln>
+            <a:effectLst/>
+          </p:spPr>
+          <p:style>
+            <a:lnRef idx="1">
+              <a:schemeClr val="accent1"/>
+            </a:lnRef>
+            <a:fillRef idx="3">
+              <a:schemeClr val="accent1"/>
+            </a:fillRef>
+            <a:effectRef idx="2">
+              <a:schemeClr val="accent1"/>
+            </a:effectRef>
+            <a:fontRef idx="minor">
+              <a:schemeClr val="lt1"/>
+            </a:fontRef>
+          </p:style>
+          <p:txBody>
+            <a:bodyPr rtlCol="0" anchor="ctr"/>
+            <a:lstStyle/>
+            <a:p>
+              <a:pPr algn="ctr"/>
+              <a:endParaRPr lang="en-US"/>
+            </a:p>
+          </p:txBody>
+        </p:sp>
+        <p:sp>
+          <p:nvSpPr>
+            <p:cNvPr id="115" name="Isosceles Triangle 114"/>
+            <p:cNvSpPr/>
+            <p:nvPr/>
+          </p:nvSpPr>
+          <p:spPr>
+            <a:xfrm rot="2208847" flipH="1" flipV="1">
+              <a:off x="5541397" y="267885"/>
+              <a:ext cx="916387" cy="834311"/>
+            </a:xfrm>
+            <a:prstGeom prst="triangle">
+              <a:avLst/>
+            </a:prstGeom>
+            <a:solidFill>
+              <a:schemeClr val="accent1">
+                <a:lumMod val="60000"/>
+                <a:lumOff val="40000"/>
+              </a:schemeClr>
+            </a:solidFill>
+            <a:ln>
+              <a:noFill/>
+            </a:ln>
+            <a:effectLst/>
+          </p:spPr>
+          <p:style>
+            <a:lnRef idx="1">
+              <a:schemeClr val="accent1"/>
+            </a:lnRef>
+            <a:fillRef idx="3">
+              <a:schemeClr val="accent1"/>
+            </a:fillRef>
+            <a:effectRef idx="2">
+              <a:schemeClr val="accent1"/>
+            </a:effectRef>
+            <a:fontRef idx="minor">
+              <a:schemeClr val="lt1"/>
+            </a:fontRef>
+          </p:style>
+          <p:txBody>
+            <a:bodyPr rtlCol="0" anchor="ctr"/>
+            <a:lstStyle/>
+            <a:p>
+              <a:pPr algn="ctr"/>
+              <a:endParaRPr lang="en-US"/>
+            </a:p>
+          </p:txBody>
+        </p:sp>
+        <p:sp>
+          <p:nvSpPr>
+            <p:cNvPr id="116" name="Right Triangle 115"/>
+            <p:cNvSpPr/>
+            <p:nvPr/>
+          </p:nvSpPr>
+          <p:spPr>
+            <a:xfrm flipH="1">
+              <a:off x="5749380" y="1932631"/>
+              <a:ext cx="439163" cy="379490"/>
+            </a:xfrm>
+            <a:prstGeom prst="rtTriangle">
+              <a:avLst/>
+            </a:prstGeom>
+            <a:solidFill>
+              <a:schemeClr val="accent1">
+                <a:lumMod val="50000"/>
+              </a:schemeClr>
+            </a:solidFill>
+            <a:ln>
+              <a:noFill/>
+            </a:ln>
+            <a:effectLst/>
+          </p:spPr>
+          <p:style>
+            <a:lnRef idx="1">
+              <a:schemeClr val="accent1"/>
+            </a:lnRef>
+            <a:fillRef idx="3">
+              <a:schemeClr val="accent1"/>
+            </a:fillRef>
+            <a:effectRef idx="2">
+              <a:schemeClr val="accent1"/>
+            </a:effectRef>
+            <a:fontRef idx="minor">
+              <a:schemeClr val="lt1"/>
+            </a:fontRef>
+          </p:style>
+          <p:txBody>
+            <a:bodyPr rtlCol="0" anchor="ctr"/>
+            <a:lstStyle/>
+            <a:p>
+              <a:pPr algn="ctr"/>
+              <a:endParaRPr lang="en-US"/>
+            </a:p>
+          </p:txBody>
+        </p:sp>
+        <p:sp>
+          <p:nvSpPr>
+            <p:cNvPr id="141" name="Right Triangle 140"/>
+            <p:cNvSpPr/>
+            <p:nvPr/>
+          </p:nvSpPr>
+          <p:spPr>
+            <a:xfrm rot="1440107">
+              <a:off x="6640955" y="5834602"/>
+              <a:ext cx="800180" cy="811575"/>
+            </a:xfrm>
+            <a:prstGeom prst="rtTriangle">
+              <a:avLst/>
+            </a:prstGeom>
+            <a:solidFill>
+              <a:schemeClr val="tx2">
+                <a:lumMod val="50000"/>
+              </a:schemeClr>
+            </a:solidFill>
+            <a:ln>
+              <a:noFill/>
+            </a:ln>
+            <a:effectLst/>
+          </p:spPr>
+          <p:style>
+            <a:lnRef idx="1">
+              <a:schemeClr val="accent1"/>
+            </a:lnRef>
+            <a:fillRef idx="3">
+              <a:schemeClr val="accent1"/>
+            </a:fillRef>
+            <a:effectRef idx="2">
+              <a:schemeClr val="accent1"/>
+            </a:effectRef>
+            <a:fontRef idx="minor">
+              <a:schemeClr val="lt1"/>
+            </a:fontRef>
+          </p:style>
+          <p:txBody>
+            <a:bodyPr rtlCol="0" anchor="ctr"/>
+            <a:lstStyle/>
+            <a:p>
+              <a:pPr algn="ctr"/>
+              <a:endParaRPr lang="en-US"/>
+            </a:p>
+          </p:txBody>
+        </p:sp>
+        <p:sp>
+          <p:nvSpPr>
+            <p:cNvPr id="142" name="Isosceles Triangle 141"/>
+            <p:cNvSpPr/>
+            <p:nvPr/>
+          </p:nvSpPr>
+          <p:spPr>
+            <a:xfrm rot="1945215">
+              <a:off x="6627648" y="5106206"/>
+              <a:ext cx="1044222" cy="740633"/>
+            </a:xfrm>
+            <a:prstGeom prst="triangle">
+              <a:avLst/>
+            </a:prstGeom>
+            <a:solidFill>
+              <a:schemeClr val="tx2">
+                <a:lumMod val="75000"/>
+              </a:schemeClr>
+            </a:solidFill>
+            <a:ln>
+              <a:noFill/>
+            </a:ln>
+            <a:effectLst/>
+          </p:spPr>
+          <p:style>
+            <a:lnRef idx="1">
+              <a:schemeClr val="accent1"/>
+            </a:lnRef>
+            <a:fillRef idx="3">
+              <a:schemeClr val="accent1"/>
+            </a:fillRef>
+            <a:effectRef idx="2">
+              <a:schemeClr val="accent1"/>
+            </a:effectRef>
+            <a:fontRef idx="minor">
+              <a:schemeClr val="lt1"/>
+            </a:fontRef>
+          </p:style>
+          <p:txBody>
+            <a:bodyPr rtlCol="0" anchor="ctr"/>
+            <a:lstStyle/>
+            <a:p>
+              <a:pPr algn="ctr"/>
+              <a:endParaRPr lang="en-US"/>
+            </a:p>
+          </p:txBody>
+        </p:sp>
+        <p:sp>
+          <p:nvSpPr>
+            <p:cNvPr id="143" name="Isosceles Triangle 142"/>
+            <p:cNvSpPr/>
+            <p:nvPr/>
+          </p:nvSpPr>
+          <p:spPr>
+            <a:xfrm rot="3867000">
+              <a:off x="6782499" y="4452479"/>
+              <a:ext cx="585363" cy="971967"/>
+            </a:xfrm>
+            <a:prstGeom prst="triangle">
+              <a:avLst/>
+            </a:prstGeom>
+            <a:solidFill>
+              <a:schemeClr val="tx2">
+                <a:lumMod val="60000"/>
+                <a:lumOff val="40000"/>
+              </a:schemeClr>
+            </a:solidFill>
+            <a:ln>
+              <a:noFill/>
+            </a:ln>
+            <a:effectLst/>
+          </p:spPr>
+          <p:style>
+            <a:lnRef idx="1">
+              <a:schemeClr val="accent1"/>
+            </a:lnRef>
+            <a:fillRef idx="3">
+              <a:schemeClr val="accent1"/>
+            </a:fillRef>
+            <a:effectRef idx="2">
+              <a:schemeClr val="accent1"/>
+            </a:effectRef>
+            <a:fontRef idx="minor">
+              <a:schemeClr val="lt1"/>
+            </a:fontRef>
+          </p:style>
+          <p:txBody>
+            <a:bodyPr rtlCol="0" anchor="ctr"/>
+            <a:lstStyle/>
+            <a:p>
+              <a:pPr algn="ctr"/>
+              <a:endParaRPr lang="en-US"/>
+            </a:p>
+          </p:txBody>
+        </p:sp>
+        <p:sp>
+          <p:nvSpPr>
+            <p:cNvPr id="144" name="Right Triangle 143"/>
+            <p:cNvSpPr/>
+            <p:nvPr/>
+          </p:nvSpPr>
+          <p:spPr>
+            <a:xfrm rot="20725757" flipH="1">
+              <a:off x="7014984" y="5388980"/>
+              <a:ext cx="938424" cy="1073302"/>
+            </a:xfrm>
+            <a:prstGeom prst="rtTriangle">
+              <a:avLst/>
+            </a:prstGeom>
+            <a:solidFill>
+              <a:schemeClr val="accent1">
+                <a:lumMod val="75000"/>
+              </a:schemeClr>
+            </a:solidFill>
+            <a:ln>
+              <a:noFill/>
+            </a:ln>
+            <a:effectLst/>
+          </p:spPr>
+          <p:style>
+            <a:lnRef idx="1">
+              <a:schemeClr val="accent1"/>
+            </a:lnRef>
+            <a:fillRef idx="3">
+              <a:schemeClr val="accent1"/>
+            </a:fillRef>
+            <a:effectRef idx="2">
+              <a:schemeClr val="accent1"/>
+            </a:effectRef>
+            <a:fontRef idx="minor">
+              <a:schemeClr val="lt1"/>
+            </a:fontRef>
+          </p:style>
+          <p:txBody>
+            <a:bodyPr rtlCol="0" anchor="ctr"/>
+            <a:lstStyle/>
+            <a:p>
+              <a:pPr algn="ctr"/>
+              <a:endParaRPr lang="en-US"/>
+            </a:p>
+          </p:txBody>
+        </p:sp>
+        <p:sp>
+          <p:nvSpPr>
+            <p:cNvPr id="145" name="Isosceles Triangle 144"/>
+            <p:cNvSpPr/>
+            <p:nvPr/>
+          </p:nvSpPr>
+          <p:spPr>
+            <a:xfrm rot="2208847" flipH="1" flipV="1">
+              <a:off x="7153318" y="4735884"/>
+              <a:ext cx="916387" cy="834311"/>
+            </a:xfrm>
+            <a:prstGeom prst="triangle">
+              <a:avLst/>
+            </a:prstGeom>
+            <a:solidFill>
+              <a:schemeClr val="accent1">
+                <a:lumMod val="60000"/>
+                <a:lumOff val="40000"/>
+              </a:schemeClr>
+            </a:solidFill>
+            <a:ln>
+              <a:noFill/>
+            </a:ln>
+            <a:effectLst/>
+          </p:spPr>
+          <p:style>
+            <a:lnRef idx="1">
+              <a:schemeClr val="accent1"/>
+            </a:lnRef>
+            <a:fillRef idx="3">
+              <a:schemeClr val="accent1"/>
+            </a:fillRef>
+            <a:effectRef idx="2">
+              <a:schemeClr val="accent1"/>
+            </a:effectRef>
+            <a:fontRef idx="minor">
+              <a:schemeClr val="lt1"/>
+            </a:fontRef>
+          </p:style>
+          <p:txBody>
+            <a:bodyPr rtlCol="0" anchor="ctr"/>
+            <a:lstStyle/>
+            <a:p>
+              <a:pPr algn="ctr"/>
+              <a:endParaRPr lang="en-US"/>
+            </a:p>
+          </p:txBody>
+        </p:sp>
+        <p:sp>
+          <p:nvSpPr>
+            <p:cNvPr id="146" name="Right Triangle 145"/>
+            <p:cNvSpPr/>
+            <p:nvPr/>
+          </p:nvSpPr>
+          <p:spPr>
+            <a:xfrm flipH="1">
+              <a:off x="7361301" y="6400630"/>
+              <a:ext cx="439163" cy="379490"/>
+            </a:xfrm>
+            <a:prstGeom prst="rtTriangle">
+              <a:avLst/>
+            </a:prstGeom>
+            <a:solidFill>
+              <a:schemeClr val="accent1">
+                <a:lumMod val="50000"/>
+              </a:schemeClr>
+            </a:solidFill>
+            <a:ln>
+              <a:noFill/>
+            </a:ln>
+            <a:effectLst/>
+          </p:spPr>
+          <p:style>
+            <a:lnRef idx="1">
+              <a:schemeClr val="accent1"/>
+            </a:lnRef>
+            <a:fillRef idx="3">
+              <a:schemeClr val="accent1"/>
+            </a:fillRef>
+            <a:effectRef idx="2">
+              <a:schemeClr val="accent1"/>
+            </a:effectRef>
+            <a:fontRef idx="minor">
+              <a:schemeClr val="lt1"/>
+            </a:fontRef>
+          </p:style>
+          <p:txBody>
+            <a:bodyPr rtlCol="0" anchor="ctr"/>
+            <a:lstStyle/>
+            <a:p>
+              <a:pPr algn="ctr"/>
+              <a:endParaRPr lang="en-US"/>
+            </a:p>
+          </p:txBody>
+        </p:sp>
+        <p:sp>
+          <p:nvSpPr>
+            <p:cNvPr id="147" name="Right Triangle 146"/>
+            <p:cNvSpPr/>
+            <p:nvPr/>
+          </p:nvSpPr>
+          <p:spPr>
+            <a:xfrm rot="1440107">
+              <a:off x="8248068" y="5834601"/>
+              <a:ext cx="800180" cy="811575"/>
+            </a:xfrm>
+            <a:prstGeom prst="rtTriangle">
+              <a:avLst/>
+            </a:prstGeom>
+            <a:solidFill>
+              <a:schemeClr val="tx2">
+                <a:lumMod val="50000"/>
+              </a:schemeClr>
+            </a:solidFill>
+            <a:ln>
+              <a:noFill/>
+            </a:ln>
+            <a:effectLst/>
+          </p:spPr>
+          <p:style>
+            <a:lnRef idx="1">
+              <a:schemeClr val="accent1"/>
+            </a:lnRef>
+            <a:fillRef idx="3">
+              <a:schemeClr val="accent1"/>
+            </a:fillRef>
+            <a:effectRef idx="2">
+              <a:schemeClr val="accent1"/>
+            </a:effectRef>
+            <a:fontRef idx="minor">
+              <a:schemeClr val="lt1"/>
+            </a:fontRef>
+          </p:style>
+          <p:txBody>
+            <a:bodyPr rtlCol="0" anchor="ctr"/>
+            <a:lstStyle/>
+            <a:p>
+              <a:pPr algn="ctr"/>
+              <a:endParaRPr lang="en-US"/>
+            </a:p>
+          </p:txBody>
+        </p:sp>
+        <p:sp>
+          <p:nvSpPr>
+            <p:cNvPr id="148" name="Isosceles Triangle 147"/>
+            <p:cNvSpPr/>
+            <p:nvPr/>
+          </p:nvSpPr>
+          <p:spPr>
+            <a:xfrm rot="1945215">
+              <a:off x="8234761" y="5106205"/>
+              <a:ext cx="1044222" cy="740633"/>
+            </a:xfrm>
+            <a:prstGeom prst="triangle">
+              <a:avLst/>
+            </a:prstGeom>
+            <a:solidFill>
+              <a:schemeClr val="tx2">
+                <a:lumMod val="75000"/>
+              </a:schemeClr>
+            </a:solidFill>
+            <a:ln>
+              <a:noFill/>
+            </a:ln>
+            <a:effectLst/>
+          </p:spPr>
+          <p:style>
+            <a:lnRef idx="1">
+              <a:schemeClr val="accent1"/>
+            </a:lnRef>
+            <a:fillRef idx="3">
+              <a:schemeClr val="accent1"/>
+            </a:fillRef>
+            <a:effectRef idx="2">
+              <a:schemeClr val="accent1"/>
+            </a:effectRef>
+            <a:fontRef idx="minor">
+              <a:schemeClr val="lt1"/>
+            </a:fontRef>
+          </p:style>
+          <p:txBody>
+            <a:bodyPr rtlCol="0" anchor="ctr"/>
+            <a:lstStyle/>
+            <a:p>
+              <a:pPr algn="ctr"/>
+              <a:endParaRPr lang="en-US"/>
+            </a:p>
+          </p:txBody>
+        </p:sp>
+        <p:sp>
+          <p:nvSpPr>
+            <p:cNvPr id="149" name="Isosceles Triangle 148"/>
+            <p:cNvSpPr/>
+            <p:nvPr/>
+          </p:nvSpPr>
+          <p:spPr>
+            <a:xfrm rot="3867000">
+              <a:off x="8389612" y="4452478"/>
+              <a:ext cx="585363" cy="971967"/>
+            </a:xfrm>
+            <a:prstGeom prst="triangle">
+              <a:avLst/>
+            </a:prstGeom>
+            <a:solidFill>
+              <a:schemeClr val="tx2">
+                <a:lumMod val="60000"/>
+                <a:lumOff val="40000"/>
+              </a:schemeClr>
+            </a:solidFill>
+            <a:ln>
+              <a:noFill/>
+            </a:ln>
+            <a:effectLst/>
+          </p:spPr>
+          <p:style>
+            <a:lnRef idx="1">
+              <a:schemeClr val="accent1"/>
+            </a:lnRef>
+            <a:fillRef idx="3">
+              <a:schemeClr val="accent1"/>
+            </a:fillRef>
+            <a:effectRef idx="2">
+              <a:schemeClr val="accent1"/>
+            </a:effectRef>
+            <a:fontRef idx="minor">
+              <a:schemeClr val="lt1"/>
+            </a:fontRef>
+          </p:style>
+          <p:txBody>
+            <a:bodyPr rtlCol="0" anchor="ctr"/>
+            <a:lstStyle/>
+            <a:p>
+              <a:pPr algn="ctr"/>
+              <a:endParaRPr lang="en-US"/>
+            </a:p>
+          </p:txBody>
+        </p:sp>
+        <p:sp>
+          <p:nvSpPr>
+            <p:cNvPr id="165" name="Right Triangle 164"/>
+            <p:cNvSpPr/>
+            <p:nvPr/>
+          </p:nvSpPr>
+          <p:spPr>
+            <a:xfrm rot="1440107">
+              <a:off x="6627165" y="3599974"/>
+              <a:ext cx="800180" cy="811575"/>
+            </a:xfrm>
+            <a:prstGeom prst="rtTriangle">
+              <a:avLst/>
+            </a:prstGeom>
+            <a:solidFill>
+              <a:schemeClr val="tx2">
+                <a:lumMod val="50000"/>
+              </a:schemeClr>
+            </a:solidFill>
+            <a:ln>
+              <a:noFill/>
+            </a:ln>
+            <a:effectLst/>
+          </p:spPr>
+          <p:style>
+            <a:lnRef idx="1">
+              <a:schemeClr val="accent1"/>
+            </a:lnRef>
+            <a:fillRef idx="3">
+              <a:schemeClr val="accent1"/>
+            </a:fillRef>
+            <a:effectRef idx="2">
+              <a:schemeClr val="accent1"/>
+            </a:effectRef>
+            <a:fontRef idx="minor">
+              <a:schemeClr val="lt1"/>
+            </a:fontRef>
+          </p:style>
+          <p:txBody>
+            <a:bodyPr rtlCol="0" anchor="ctr"/>
+            <a:lstStyle/>
+            <a:p>
+              <a:pPr algn="ctr"/>
+              <a:endParaRPr lang="en-US"/>
+            </a:p>
+          </p:txBody>
+        </p:sp>
+        <p:sp>
+          <p:nvSpPr>
+            <p:cNvPr id="166" name="Isosceles Triangle 165"/>
+            <p:cNvSpPr/>
+            <p:nvPr/>
+          </p:nvSpPr>
+          <p:spPr>
+            <a:xfrm rot="1945215">
+              <a:off x="6613858" y="2871578"/>
+              <a:ext cx="1044222" cy="740633"/>
+            </a:xfrm>
+            <a:prstGeom prst="triangle">
+              <a:avLst/>
+            </a:prstGeom>
+            <a:solidFill>
+              <a:schemeClr val="tx2">
+                <a:lumMod val="75000"/>
+              </a:schemeClr>
+            </a:solidFill>
+            <a:ln>
+              <a:noFill/>
+            </a:ln>
+            <a:effectLst/>
+          </p:spPr>
+          <p:style>
+            <a:lnRef idx="1">
+              <a:schemeClr val="accent1"/>
+            </a:lnRef>
+            <a:fillRef idx="3">
+              <a:schemeClr val="accent1"/>
+            </a:fillRef>
+            <a:effectRef idx="2">
+              <a:schemeClr val="accent1"/>
+            </a:effectRef>
+            <a:fontRef idx="minor">
+              <a:schemeClr val="lt1"/>
+            </a:fontRef>
+          </p:style>
+          <p:txBody>
+            <a:bodyPr rtlCol="0" anchor="ctr"/>
+            <a:lstStyle/>
+            <a:p>
+              <a:pPr algn="ctr"/>
+              <a:endParaRPr lang="en-US"/>
+            </a:p>
+          </p:txBody>
+        </p:sp>
+        <p:sp>
+          <p:nvSpPr>
+            <p:cNvPr id="167" name="Isosceles Triangle 166"/>
+            <p:cNvSpPr/>
+            <p:nvPr/>
+          </p:nvSpPr>
+          <p:spPr>
+            <a:xfrm rot="3867000">
+              <a:off x="6768709" y="2217851"/>
+              <a:ext cx="585363" cy="971967"/>
+            </a:xfrm>
+            <a:prstGeom prst="triangle">
+              <a:avLst/>
+            </a:prstGeom>
+            <a:solidFill>
+              <a:schemeClr val="tx2">
+                <a:lumMod val="60000"/>
+                <a:lumOff val="40000"/>
+              </a:schemeClr>
+            </a:solidFill>
+            <a:ln>
+              <a:noFill/>
+            </a:ln>
+            <a:effectLst/>
+          </p:spPr>
+          <p:style>
+            <a:lnRef idx="1">
+              <a:schemeClr val="accent1"/>
+            </a:lnRef>
+            <a:fillRef idx="3">
+              <a:schemeClr val="accent1"/>
+            </a:fillRef>
+            <a:effectRef idx="2">
+              <a:schemeClr val="accent1"/>
+            </a:effectRef>
+            <a:fontRef idx="minor">
+              <a:schemeClr val="lt1"/>
+            </a:fontRef>
+          </p:style>
+          <p:txBody>
+            <a:bodyPr rtlCol="0" anchor="ctr"/>
+            <a:lstStyle/>
+            <a:p>
+              <a:pPr algn="ctr"/>
+              <a:endParaRPr lang="en-US"/>
+            </a:p>
+          </p:txBody>
+        </p:sp>
+        <p:sp>
+          <p:nvSpPr>
+            <p:cNvPr id="168" name="Right Triangle 167"/>
+            <p:cNvSpPr/>
+            <p:nvPr/>
+          </p:nvSpPr>
+          <p:spPr>
+            <a:xfrm rot="20725757" flipH="1">
+              <a:off x="7001194" y="3154352"/>
+              <a:ext cx="938424" cy="1073302"/>
+            </a:xfrm>
+            <a:prstGeom prst="rtTriangle">
+              <a:avLst/>
+            </a:prstGeom>
+            <a:solidFill>
+              <a:schemeClr val="accent1">
+                <a:lumMod val="75000"/>
+              </a:schemeClr>
+            </a:solidFill>
+            <a:ln>
+              <a:noFill/>
+            </a:ln>
+            <a:effectLst/>
+          </p:spPr>
+          <p:style>
+            <a:lnRef idx="1">
+              <a:schemeClr val="accent1"/>
+            </a:lnRef>
+            <a:fillRef idx="3">
+              <a:schemeClr val="accent1"/>
+            </a:fillRef>
+            <a:effectRef idx="2">
+              <a:schemeClr val="accent1"/>
+            </a:effectRef>
+            <a:fontRef idx="minor">
+              <a:schemeClr val="lt1"/>
+            </a:fontRef>
+          </p:style>
+          <p:txBody>
+            <a:bodyPr rtlCol="0" anchor="ctr"/>
+            <a:lstStyle/>
+            <a:p>
+              <a:pPr algn="ctr"/>
+              <a:endParaRPr lang="en-US"/>
+            </a:p>
+          </p:txBody>
+        </p:sp>
+        <p:sp>
+          <p:nvSpPr>
+            <p:cNvPr id="169" name="Isosceles Triangle 168"/>
+            <p:cNvSpPr/>
+            <p:nvPr/>
+          </p:nvSpPr>
+          <p:spPr>
+            <a:xfrm rot="2208847" flipH="1" flipV="1">
+              <a:off x="7139528" y="2501256"/>
+              <a:ext cx="916387" cy="834311"/>
+            </a:xfrm>
+            <a:prstGeom prst="triangle">
+              <a:avLst/>
+            </a:prstGeom>
+            <a:solidFill>
+              <a:schemeClr val="accent1">
+                <a:lumMod val="60000"/>
+                <a:lumOff val="40000"/>
+              </a:schemeClr>
+            </a:solidFill>
+            <a:ln>
+              <a:noFill/>
+            </a:ln>
+            <a:effectLst/>
+          </p:spPr>
+          <p:style>
+            <a:lnRef idx="1">
+              <a:schemeClr val="accent1"/>
+            </a:lnRef>
+            <a:fillRef idx="3">
+              <a:schemeClr val="accent1"/>
+            </a:fillRef>
+            <a:effectRef idx="2">
+              <a:schemeClr val="accent1"/>
+            </a:effectRef>
+            <a:fontRef idx="minor">
+              <a:schemeClr val="lt1"/>
+            </a:fontRef>
+          </p:style>
+          <p:txBody>
+            <a:bodyPr rtlCol="0" anchor="ctr"/>
+            <a:lstStyle/>
+            <a:p>
+              <a:pPr algn="ctr"/>
+              <a:endParaRPr lang="en-US"/>
+            </a:p>
+          </p:txBody>
+        </p:sp>
+        <p:sp>
+          <p:nvSpPr>
+            <p:cNvPr id="170" name="Right Triangle 169"/>
+            <p:cNvSpPr/>
+            <p:nvPr/>
+          </p:nvSpPr>
+          <p:spPr>
+            <a:xfrm flipH="1">
+              <a:off x="7347511" y="4166002"/>
+              <a:ext cx="439163" cy="379490"/>
+            </a:xfrm>
+            <a:prstGeom prst="rtTriangle">
+              <a:avLst/>
+            </a:prstGeom>
+            <a:solidFill>
+              <a:schemeClr val="accent1">
+                <a:lumMod val="50000"/>
+              </a:schemeClr>
+            </a:solidFill>
+            <a:ln>
+              <a:noFill/>
+            </a:ln>
+            <a:effectLst/>
+          </p:spPr>
+          <p:style>
+            <a:lnRef idx="1">
+              <a:schemeClr val="accent1"/>
+            </a:lnRef>
+            <a:fillRef idx="3">
+              <a:schemeClr val="accent1"/>
+            </a:fillRef>
+            <a:effectRef idx="2">
+              <a:schemeClr val="accent1"/>
+            </a:effectRef>
+            <a:fontRef idx="minor">
+              <a:schemeClr val="lt1"/>
+            </a:fontRef>
+          </p:style>
+          <p:txBody>
+            <a:bodyPr rtlCol="0" anchor="ctr"/>
+            <a:lstStyle/>
+            <a:p>
+              <a:pPr algn="ctr"/>
+              <a:endParaRPr lang="en-US"/>
+            </a:p>
+          </p:txBody>
+        </p:sp>
+        <p:sp>
+          <p:nvSpPr>
+            <p:cNvPr id="171" name="Right Triangle 170"/>
+            <p:cNvSpPr/>
+            <p:nvPr/>
+          </p:nvSpPr>
+          <p:spPr>
+            <a:xfrm rot="1440107">
+              <a:off x="8234278" y="3599973"/>
+              <a:ext cx="800180" cy="811575"/>
+            </a:xfrm>
+            <a:prstGeom prst="rtTriangle">
+              <a:avLst/>
+            </a:prstGeom>
+            <a:solidFill>
+              <a:schemeClr val="tx2">
+                <a:lumMod val="50000"/>
+              </a:schemeClr>
+            </a:solidFill>
+            <a:ln>
+              <a:noFill/>
+            </a:ln>
+            <a:effectLst/>
+          </p:spPr>
+          <p:style>
+            <a:lnRef idx="1">
+              <a:schemeClr val="accent1"/>
+            </a:lnRef>
+            <a:fillRef idx="3">
+              <a:schemeClr val="accent1"/>
+            </a:fillRef>
+            <a:effectRef idx="2">
+              <a:schemeClr val="accent1"/>
+            </a:effectRef>
+            <a:fontRef idx="minor">
+              <a:schemeClr val="lt1"/>
+            </a:fontRef>
+          </p:style>
+          <p:txBody>
+            <a:bodyPr rtlCol="0" anchor="ctr"/>
+            <a:lstStyle/>
+            <a:p>
+              <a:pPr algn="ctr"/>
+              <a:endParaRPr lang="en-US"/>
+            </a:p>
+          </p:txBody>
+        </p:sp>
+        <p:sp>
+          <p:nvSpPr>
+            <p:cNvPr id="172" name="Isosceles Triangle 171"/>
+            <p:cNvSpPr/>
+            <p:nvPr/>
+          </p:nvSpPr>
+          <p:spPr>
+            <a:xfrm rot="1945215">
+              <a:off x="8220971" y="2871577"/>
+              <a:ext cx="1044222" cy="740633"/>
+            </a:xfrm>
+            <a:prstGeom prst="triangle">
+              <a:avLst/>
+            </a:prstGeom>
+            <a:solidFill>
+              <a:schemeClr val="tx2">
+                <a:lumMod val="75000"/>
+              </a:schemeClr>
+            </a:solidFill>
+            <a:ln>
+              <a:noFill/>
+            </a:ln>
+            <a:effectLst/>
+          </p:spPr>
+          <p:style>
+            <a:lnRef idx="1">
+              <a:schemeClr val="accent1"/>
+            </a:lnRef>
+            <a:fillRef idx="3">
+              <a:schemeClr val="accent1"/>
+            </a:fillRef>
+            <a:effectRef idx="2">
+              <a:schemeClr val="accent1"/>
+            </a:effectRef>
+            <a:fontRef idx="minor">
+              <a:schemeClr val="lt1"/>
+            </a:fontRef>
+          </p:style>
+          <p:txBody>
+            <a:bodyPr rtlCol="0" anchor="ctr"/>
+            <a:lstStyle/>
+            <a:p>
+              <a:pPr algn="ctr"/>
+              <a:endParaRPr lang="en-US"/>
+            </a:p>
+          </p:txBody>
+        </p:sp>
+        <p:sp>
+          <p:nvSpPr>
+            <p:cNvPr id="173" name="Isosceles Triangle 172"/>
+            <p:cNvSpPr/>
+            <p:nvPr/>
+          </p:nvSpPr>
+          <p:spPr>
+            <a:xfrm rot="3867000">
+              <a:off x="8375822" y="2217850"/>
+              <a:ext cx="585363" cy="971967"/>
+            </a:xfrm>
+            <a:prstGeom prst="triangle">
+              <a:avLst/>
+            </a:prstGeom>
+            <a:solidFill>
+              <a:schemeClr val="tx2">
+                <a:lumMod val="60000"/>
+                <a:lumOff val="40000"/>
+              </a:schemeClr>
+            </a:solidFill>
+            <a:ln>
+              <a:noFill/>
+            </a:ln>
+            <a:effectLst/>
+          </p:spPr>
+          <p:style>
+            <a:lnRef idx="1">
+              <a:schemeClr val="accent1"/>
+            </a:lnRef>
+            <a:fillRef idx="3">
+              <a:schemeClr val="accent1"/>
+            </a:fillRef>
+            <a:effectRef idx="2">
+              <a:schemeClr val="accent1"/>
+            </a:effectRef>
+            <a:fontRef idx="minor">
+              <a:schemeClr val="lt1"/>
+            </a:fontRef>
+          </p:style>
+          <p:txBody>
+            <a:bodyPr rtlCol="0" anchor="ctr"/>
+            <a:lstStyle/>
+            <a:p>
+              <a:pPr algn="ctr"/>
+              <a:endParaRPr lang="en-US"/>
+            </a:p>
+          </p:txBody>
+        </p:sp>
+        <p:sp>
+          <p:nvSpPr>
+            <p:cNvPr id="189" name="Right Triangle 188"/>
+            <p:cNvSpPr/>
+            <p:nvPr/>
+          </p:nvSpPr>
+          <p:spPr>
+            <a:xfrm rot="1440107">
+              <a:off x="6629907" y="1364366"/>
+              <a:ext cx="800180" cy="811575"/>
+            </a:xfrm>
+            <a:prstGeom prst="rtTriangle">
+              <a:avLst/>
+            </a:prstGeom>
+            <a:solidFill>
+              <a:schemeClr val="tx2">
+                <a:lumMod val="50000"/>
+              </a:schemeClr>
+            </a:solidFill>
+            <a:ln>
+              <a:noFill/>
+            </a:ln>
+            <a:effectLst/>
+          </p:spPr>
+          <p:style>
+            <a:lnRef idx="1">
+              <a:schemeClr val="accent1"/>
+            </a:lnRef>
+            <a:fillRef idx="3">
+              <a:schemeClr val="accent1"/>
+            </a:fillRef>
+            <a:effectRef idx="2">
+              <a:schemeClr val="accent1"/>
+            </a:effectRef>
+            <a:fontRef idx="minor">
+              <a:schemeClr val="lt1"/>
+            </a:fontRef>
+          </p:style>
+          <p:txBody>
+            <a:bodyPr rtlCol="0" anchor="ctr"/>
+            <a:lstStyle/>
+            <a:p>
+              <a:pPr algn="ctr"/>
+              <a:endParaRPr lang="en-US"/>
+            </a:p>
+          </p:txBody>
+        </p:sp>
+        <p:sp>
+          <p:nvSpPr>
+            <p:cNvPr id="190" name="Isosceles Triangle 189"/>
+            <p:cNvSpPr/>
+            <p:nvPr/>
+          </p:nvSpPr>
+          <p:spPr>
+            <a:xfrm rot="1945215">
+              <a:off x="6616600" y="635970"/>
+              <a:ext cx="1044222" cy="740633"/>
+            </a:xfrm>
+            <a:prstGeom prst="triangle">
+              <a:avLst/>
+            </a:prstGeom>
+            <a:solidFill>
+              <a:schemeClr val="tx2">
+                <a:lumMod val="75000"/>
+              </a:schemeClr>
+            </a:solidFill>
+            <a:ln>
+              <a:noFill/>
+            </a:ln>
+            <a:effectLst/>
+          </p:spPr>
+          <p:style>
+            <a:lnRef idx="1">
+              <a:schemeClr val="accent1"/>
+            </a:lnRef>
+            <a:fillRef idx="3">
+              <a:schemeClr val="accent1"/>
+            </a:fillRef>
+            <a:effectRef idx="2">
+              <a:schemeClr val="accent1"/>
+            </a:effectRef>
+            <a:fontRef idx="minor">
+              <a:schemeClr val="lt1"/>
+            </a:fontRef>
+          </p:style>
+          <p:txBody>
+            <a:bodyPr rtlCol="0" anchor="ctr"/>
+            <a:lstStyle/>
+            <a:p>
+              <a:pPr algn="ctr"/>
+              <a:endParaRPr lang="en-US"/>
+            </a:p>
+          </p:txBody>
+        </p:sp>
+        <p:sp>
+          <p:nvSpPr>
+            <p:cNvPr id="191" name="Isosceles Triangle 190"/>
+            <p:cNvSpPr/>
+            <p:nvPr/>
+          </p:nvSpPr>
+          <p:spPr>
+            <a:xfrm rot="3867000">
+              <a:off x="6771451" y="-17757"/>
+              <a:ext cx="585363" cy="971967"/>
+            </a:xfrm>
+            <a:prstGeom prst="triangle">
+              <a:avLst/>
+            </a:prstGeom>
+            <a:solidFill>
+              <a:schemeClr val="tx2">
+                <a:lumMod val="60000"/>
+                <a:lumOff val="40000"/>
+              </a:schemeClr>
+            </a:solidFill>
+            <a:ln>
+              <a:noFill/>
+            </a:ln>
+            <a:effectLst/>
+          </p:spPr>
+          <p:style>
+            <a:lnRef idx="1">
+              <a:schemeClr val="accent1"/>
+            </a:lnRef>
+            <a:fillRef idx="3">
+              <a:schemeClr val="accent1"/>
+            </a:fillRef>
+            <a:effectRef idx="2">
+              <a:schemeClr val="accent1"/>
+            </a:effectRef>
+            <a:fontRef idx="minor">
+              <a:schemeClr val="lt1"/>
+            </a:fontRef>
+          </p:style>
+          <p:txBody>
+            <a:bodyPr rtlCol="0" anchor="ctr"/>
+            <a:lstStyle/>
+            <a:p>
+              <a:pPr algn="ctr"/>
+              <a:endParaRPr lang="en-US"/>
+            </a:p>
+          </p:txBody>
+        </p:sp>
+        <p:sp>
+          <p:nvSpPr>
+            <p:cNvPr id="192" name="Right Triangle 191"/>
+            <p:cNvSpPr/>
+            <p:nvPr/>
+          </p:nvSpPr>
+          <p:spPr>
+            <a:xfrm rot="20725757" flipH="1">
+              <a:off x="7003936" y="918744"/>
+              <a:ext cx="938424" cy="1073302"/>
+            </a:xfrm>
+            <a:prstGeom prst="rtTriangle">
+              <a:avLst/>
+            </a:prstGeom>
+            <a:solidFill>
+              <a:schemeClr val="accent1">
+                <a:lumMod val="75000"/>
+              </a:schemeClr>
+            </a:solidFill>
+            <a:ln>
+              <a:noFill/>
+            </a:ln>
+            <a:effectLst/>
+          </p:spPr>
+          <p:style>
+            <a:lnRef idx="1">
+              <a:schemeClr val="accent1"/>
+            </a:lnRef>
+            <a:fillRef idx="3">
+              <a:schemeClr val="accent1"/>
+            </a:fillRef>
+            <a:effectRef idx="2">
+              <a:schemeClr val="accent1"/>
+            </a:effectRef>
+            <a:fontRef idx="minor">
+              <a:schemeClr val="lt1"/>
+            </a:fontRef>
+          </p:style>
+          <p:txBody>
+            <a:bodyPr rtlCol="0" anchor="ctr"/>
+            <a:lstStyle/>
+            <a:p>
+              <a:pPr algn="ctr"/>
+              <a:endParaRPr lang="en-US"/>
+            </a:p>
+          </p:txBody>
+        </p:sp>
+        <p:sp>
+          <p:nvSpPr>
+            <p:cNvPr id="193" name="Isosceles Triangle 192"/>
+            <p:cNvSpPr/>
+            <p:nvPr/>
+          </p:nvSpPr>
+          <p:spPr>
+            <a:xfrm rot="2208847" flipH="1" flipV="1">
+              <a:off x="7142270" y="265648"/>
+              <a:ext cx="916387" cy="834311"/>
+            </a:xfrm>
+            <a:prstGeom prst="triangle">
+              <a:avLst/>
+            </a:prstGeom>
+            <a:solidFill>
+              <a:schemeClr val="accent1">
+                <a:lumMod val="60000"/>
+                <a:lumOff val="40000"/>
+              </a:schemeClr>
+            </a:solidFill>
+            <a:ln>
+              <a:noFill/>
+            </a:ln>
+            <a:effectLst/>
+          </p:spPr>
+          <p:style>
+            <a:lnRef idx="1">
+              <a:schemeClr val="accent1"/>
+            </a:lnRef>
+            <a:fillRef idx="3">
+              <a:schemeClr val="accent1"/>
+            </a:fillRef>
+            <a:effectRef idx="2">
+              <a:schemeClr val="accent1"/>
+            </a:effectRef>
+            <a:fontRef idx="minor">
+              <a:schemeClr val="lt1"/>
+            </a:fontRef>
+          </p:style>
+          <p:txBody>
+            <a:bodyPr rtlCol="0" anchor="ctr"/>
+            <a:lstStyle/>
+            <a:p>
+              <a:pPr algn="ctr"/>
+              <a:endParaRPr lang="en-US"/>
+            </a:p>
+          </p:txBody>
+        </p:sp>
+        <p:sp>
+          <p:nvSpPr>
+            <p:cNvPr id="194" name="Right Triangle 193"/>
+            <p:cNvSpPr/>
+            <p:nvPr/>
+          </p:nvSpPr>
+          <p:spPr>
+            <a:xfrm flipH="1">
+              <a:off x="7350253" y="1930394"/>
+              <a:ext cx="439163" cy="379490"/>
+            </a:xfrm>
+            <a:prstGeom prst="rtTriangle">
+              <a:avLst/>
+            </a:prstGeom>
+            <a:solidFill>
+              <a:schemeClr val="accent1">
+                <a:lumMod val="50000"/>
+              </a:schemeClr>
+            </a:solidFill>
+            <a:ln>
+              <a:noFill/>
+            </a:ln>
+            <a:effectLst/>
+          </p:spPr>
+          <p:style>
+            <a:lnRef idx="1">
+              <a:schemeClr val="accent1"/>
+            </a:lnRef>
+            <a:fillRef idx="3">
+              <a:schemeClr val="accent1"/>
+            </a:fillRef>
+            <a:effectRef idx="2">
+              <a:schemeClr val="accent1"/>
+            </a:effectRef>
+            <a:fontRef idx="minor">
+              <a:schemeClr val="lt1"/>
+            </a:fontRef>
+          </p:style>
+          <p:txBody>
+            <a:bodyPr rtlCol="0" anchor="ctr"/>
+            <a:lstStyle/>
+            <a:p>
+              <a:pPr algn="ctr"/>
+              <a:endParaRPr lang="en-US"/>
+            </a:p>
+          </p:txBody>
+        </p:sp>
+        <p:sp>
+          <p:nvSpPr>
+            <p:cNvPr id="195" name="Right Triangle 194"/>
+            <p:cNvSpPr/>
+            <p:nvPr/>
+          </p:nvSpPr>
+          <p:spPr>
+            <a:xfrm rot="1440107">
+              <a:off x="8237020" y="1364365"/>
+              <a:ext cx="800180" cy="811575"/>
+            </a:xfrm>
+            <a:prstGeom prst="rtTriangle">
+              <a:avLst/>
+            </a:prstGeom>
+            <a:solidFill>
+              <a:schemeClr val="tx2">
+                <a:lumMod val="50000"/>
+              </a:schemeClr>
+            </a:solidFill>
+            <a:ln>
+              <a:noFill/>
+            </a:ln>
+            <a:effectLst/>
+          </p:spPr>
+          <p:style>
+            <a:lnRef idx="1">
+              <a:schemeClr val="accent1"/>
+            </a:lnRef>
+            <a:fillRef idx="3">
+              <a:schemeClr val="accent1"/>
+            </a:fillRef>
+            <a:effectRef idx="2">
+              <a:schemeClr val="accent1"/>
+            </a:effectRef>
+            <a:fontRef idx="minor">
+              <a:schemeClr val="lt1"/>
+            </a:fontRef>
+          </p:style>
+          <p:txBody>
+            <a:bodyPr rtlCol="0" anchor="ctr"/>
+            <a:lstStyle/>
+            <a:p>
+              <a:pPr algn="ctr"/>
+              <a:endParaRPr lang="en-US"/>
+            </a:p>
+          </p:txBody>
+        </p:sp>
+        <p:sp>
+          <p:nvSpPr>
+            <p:cNvPr id="196" name="Isosceles Triangle 195"/>
+            <p:cNvSpPr/>
+            <p:nvPr/>
+          </p:nvSpPr>
+          <p:spPr>
+            <a:xfrm rot="1945215">
+              <a:off x="8223713" y="635969"/>
+              <a:ext cx="1044222" cy="740633"/>
+            </a:xfrm>
+            <a:prstGeom prst="triangle">
+              <a:avLst/>
+            </a:prstGeom>
+            <a:solidFill>
+              <a:schemeClr val="tx2">
+                <a:lumMod val="75000"/>
+              </a:schemeClr>
+            </a:solidFill>
+            <a:ln>
+              <a:noFill/>
+            </a:ln>
+            <a:effectLst/>
+          </p:spPr>
+          <p:style>
+            <a:lnRef idx="1">
+              <a:schemeClr val="accent1"/>
+            </a:lnRef>
+            <a:fillRef idx="3">
+              <a:schemeClr val="accent1"/>
+            </a:fillRef>
+            <a:effectRef idx="2">
+              <a:schemeClr val="accent1"/>
+            </a:effectRef>
+            <a:fontRef idx="minor">
+              <a:schemeClr val="lt1"/>
+            </a:fontRef>
+          </p:style>
+          <p:txBody>
+            <a:bodyPr rtlCol="0" anchor="ctr"/>
+            <a:lstStyle/>
+            <a:p>
+              <a:pPr algn="ctr"/>
+              <a:endParaRPr lang="en-US"/>
+            </a:p>
+          </p:txBody>
+        </p:sp>
+        <p:sp>
+          <p:nvSpPr>
+            <p:cNvPr id="197" name="Isosceles Triangle 196"/>
+            <p:cNvSpPr/>
+            <p:nvPr/>
+          </p:nvSpPr>
+          <p:spPr>
+            <a:xfrm rot="3867000">
+              <a:off x="8378564" y="-17758"/>
+              <a:ext cx="585363" cy="971967"/>
+            </a:xfrm>
+            <a:prstGeom prst="triangle">
+              <a:avLst/>
+            </a:prstGeom>
+            <a:solidFill>
+              <a:schemeClr val="tx2">
+                <a:lumMod val="60000"/>
+                <a:lumOff val="40000"/>
+              </a:schemeClr>
+            </a:solidFill>
+            <a:ln>
+              <a:noFill/>
+            </a:ln>
+            <a:effectLst/>
+          </p:spPr>
+          <p:style>
+            <a:lnRef idx="1">
+              <a:schemeClr val="accent1"/>
+            </a:lnRef>
+            <a:fillRef idx="3">
+              <a:schemeClr val="accent1"/>
+            </a:fillRef>
+            <a:effectRef idx="2">
+              <a:schemeClr val="accent1"/>
+            </a:effectRef>
+            <a:fontRef idx="minor">
+              <a:schemeClr val="lt1"/>
+            </a:fontRef>
+          </p:style>
+          <p:txBody>
+            <a:bodyPr rtlCol="0" anchor="ctr"/>
+            <a:lstStyle/>
+            <a:p>
+              <a:pPr algn="ctr"/>
+              <a:endParaRPr lang="en-US"/>
+            </a:p>
+          </p:txBody>
+        </p:sp>
+      </p:grpSp>
     </p:spTree>
     <p:extLst>
       <p:ext uri="{BB962C8B-B14F-4D97-AF65-F5344CB8AC3E}">
@@ -3143,6 +7854,13 @@
   <p:clrMapOvr>
     <a:masterClrMapping/>
   </p:clrMapOvr>
+  <p:timing>
+    <p:tnLst>
+      <p:par>
+        <p:cTn xmlns:p14="http://schemas.microsoft.com/office/powerpoint/2010/main" id="1" dur="indefinite" restart="never" nodeType="tmRoot"/>
+      </p:par>
+    </p:tnLst>
+  </p:timing>
 </p:sld>
 </file>
 

</xml_diff>

<commit_message>
Added beginning speech to first two slides
Most of the introduction speech is on the second slide
</commit_message>
<xml_diff>
--- a/Demo Presentation/Demo Presentation.pptx
+++ b/Demo Presentation/Demo Presentation.pptx
@@ -507,11 +507,19 @@
           <a:p>
             <a:r>
               <a:rPr lang="en-US" dirty="0" smtClean="0"/>
-              <a:t>Hello Everyone!</a:t>
+              <a:t>Hello</a:t>
             </a:r>
             <a:r>
               <a:rPr lang="en-US" baseline="0" dirty="0" smtClean="0"/>
-              <a:t> We are here today to present to you the</a:t>
+              <a:t> Everyone! We are here today to introduce to you a new and exciting android application project! </a:t>
+            </a:r>
+            <a:r>
+              <a:rPr lang="en-US" baseline="0" dirty="0" err="1" smtClean="0"/>
+              <a:t>YodelIt</a:t>
+            </a:r>
+            <a:r>
+              <a:rPr lang="en-US" baseline="0" dirty="0" smtClean="0"/>
+              <a:t>! But, before we get any further, we just want to take a quick moment to introduce ourselves!</a:t>
             </a:r>
             <a:endParaRPr lang="en-US" dirty="0"/>
           </a:p>
@@ -597,6 +605,46 @@
           <a:bodyPr/>
           <a:lstStyle/>
           <a:p>
+            <a:r>
+              <a:rPr lang="en-US" dirty="0" smtClean="0"/>
+              <a:t>Now, when we first heard</a:t>
+            </a:r>
+            <a:r>
+              <a:rPr lang="en-US" baseline="0" dirty="0" smtClean="0"/>
+              <a:t> about the requirements for this programming project, the first question that we asked ourselves was how can we make this application unique and different from all the others. We took a little bit of time, and found out that there are just a little over 1.4 million apps on the Play store! That is huge number, and it just keeps on getting bigger! Approximately about 50 000 new apps are added to the app store monthly! (http://</a:t>
+            </a:r>
+            <a:r>
+              <a:rPr lang="en-US" baseline="0" dirty="0" err="1" smtClean="0"/>
+              <a:t>www.appbrain.com</a:t>
+            </a:r>
+            <a:r>
+              <a:rPr lang="en-US" baseline="0" dirty="0" smtClean="0"/>
+              <a:t>/stats/number-of-android-apps) Now, with that much of a market, it becomes very difficult to get any attention whatsoever from consumers. And yet, there are some apps that are picked up by a sizeable percentage of users almost immediately! So, what exactly is the difference between these top 100 or so apps, and the remaining 1.4 million? The answer my friends is brand. It’s all about how we brand something. Our world looks for the new and interesting. Not the same, old repetitions. Why did Facebook and Twitter hit it big? Because, let’s face it, there are other companies out there that do exactly the same thing. The difference is in the lexicon, the jargon that makes members feel a sense of community. And that’s exactly what </a:t>
+            </a:r>
+            <a:r>
+              <a:rPr lang="en-US" baseline="0" dirty="0" err="1" smtClean="0"/>
+              <a:t>YodelIt</a:t>
+            </a:r>
+            <a:r>
+              <a:rPr lang="en-US" baseline="0" dirty="0" smtClean="0"/>
+              <a:t> aims to do. After a lot of thinking, </a:t>
+            </a:r>
+            <a:r>
+              <a:rPr lang="en-US" baseline="0" dirty="0" err="1" smtClean="0"/>
+              <a:t>Aedan</a:t>
+            </a:r>
+            <a:r>
+              <a:rPr lang="en-US" baseline="0" dirty="0" smtClean="0"/>
+              <a:t>, came up with the fabulous idea about goats! Now, I know what you’re all thinking. How do goats fit into a question and answer app? And that my friends is where the beauty of this app lies. Let’s take a moment to think ourselves over to the Swiss Alps. Pristine snow, awesome skiing, and a very rich culture. Now, let’s think ourselves back to the app with a bit of a Swiss influence. Let’s say I want to ask a question. Too 1973, eh? Instead, I’ll yodel it over. And my good friends on the </a:t>
+            </a:r>
+            <a:r>
+              <a:rPr lang="en-US" baseline="0" dirty="0" err="1" smtClean="0"/>
+              <a:t>interweb</a:t>
+            </a:r>
+            <a:r>
+              <a:rPr lang="en-US" baseline="0" dirty="0" smtClean="0"/>
+              <a:t> will echo something back to me. New lexicon, new terminology. Something to set this app apart from the rest. But it just doesn’t stop there. Let’s take you through the app to see more.</a:t>
+            </a:r>
             <a:endParaRPr lang="en-US" dirty="0"/>
           </a:p>
         </p:txBody>
@@ -7884,7 +7932,47 @@
             <a:fillRect/>
           </a:stretch>
         </p:blipFill>
-        <p:spPr/>
+        <p:spPr>
+          <a:xfrm>
+            <a:off x="1561379" y="1989699"/>
+            <a:ext cx="6019800" cy="3310658"/>
+          </a:xfrm>
+          <a:prstGeom prst="rect">
+            <a:avLst/>
+          </a:prstGeom>
+          <a:solidFill>
+            <a:srgbClr val="FFFFFF">
+              <a:shade val="85000"/>
+            </a:srgbClr>
+          </a:solidFill>
+          <a:ln w="190500" cap="sq">
+            <a:solidFill>
+              <a:srgbClr val="FFFFFF"/>
+            </a:solidFill>
+            <a:miter lim="800000"/>
+          </a:ln>
+          <a:effectLst>
+            <a:outerShdw blurRad="65000" dist="50800" dir="12900000" kx="195000" ky="145000" algn="tl" rotWithShape="0">
+              <a:srgbClr val="000000">
+                <a:alpha val="30000"/>
+              </a:srgbClr>
+            </a:outerShdw>
+          </a:effectLst>
+          <a:scene3d>
+            <a:camera prst="orthographicFront">
+              <a:rot lat="0" lon="0" rev="360000"/>
+            </a:camera>
+            <a:lightRig rig="twoPt" dir="t">
+              <a:rot lat="0" lon="0" rev="7200000"/>
+            </a:lightRig>
+          </a:scene3d>
+          <a:sp3d contourW="12700">
+            <a:bevelT w="25400" h="19050"/>
+            <a:contourClr>
+              <a:srgbClr val="969696"/>
+            </a:contourClr>
+          </a:sp3d>
+        </p:spPr>
       </p:pic>
       <p:grpSp>
         <p:nvGrpSpPr>
@@ -8429,7 +8517,7 @@
         </p:nvSpPr>
         <p:spPr>
           <a:xfrm rot="3867000">
-            <a:off x="7567440" y="6003330"/>
+            <a:off x="7646815" y="5908080"/>
             <a:ext cx="585363" cy="971967"/>
           </a:xfrm>
           <a:prstGeom prst="triangle">

</xml_diff>

<commit_message>
Demo presentation power point
</commit_message>
<xml_diff>
--- a/Demo Presentation/Demo Presentation.pptx
+++ b/Demo Presentation/Demo Presentation.pptx
@@ -207,7 +207,7 @@
           <a:p>
             <a:fld id="{8BDA8AAB-2FDA-F14D-8731-7A5776A7C94C}" type="datetimeFigureOut">
               <a:rPr lang="en-US" smtClean="0"/>
-              <a:t>14-11-23</a:t>
+              <a:t>14-12-01</a:t>
             </a:fld>
             <a:endParaRPr lang="en-US"/>
           </a:p>
@@ -525,15 +525,7 @@
             </a:r>
             <a:r>
               <a:rPr lang="en-US" baseline="0" dirty="0" smtClean="0"/>
-              <a:t> Everyone! We are here today to introduce </a:t>
-            </a:r>
-            <a:r>
-              <a:rPr lang="en-US" baseline="0" dirty="0" smtClean="0"/>
-              <a:t>you to </a:t>
-            </a:r>
-            <a:r>
-              <a:rPr lang="en-US" baseline="0" dirty="0" smtClean="0"/>
-              <a:t>a new and exciting android application project! </a:t>
+              <a:t> Everyone! We are here today to introduce you to a new and exciting android application project! </a:t>
             </a:r>
             <a:r>
               <a:rPr lang="en-US" baseline="0" dirty="0" err="1" smtClean="0"/>
@@ -1217,7 +1209,19 @@
             </a:r>
             <a:r>
               <a:rPr lang="en-US" baseline="0" dirty="0" smtClean="0"/>
-              <a:t> App. We hope that you’ve enjoyed this preview into the app, and we can’t wait to show you our finished product next week! Before we close, does anyone have any questions?</a:t>
+              <a:t> App. We hope that you’ve enjoyed this preview into the app, and we </a:t>
+            </a:r>
+            <a:r>
+              <a:rPr lang="en-US" baseline="0" dirty="0" smtClean="0"/>
+              <a:t>hope that you all get a chance to use </a:t>
+            </a:r>
+            <a:r>
+              <a:rPr lang="en-US" baseline="0" smtClean="0"/>
+              <a:t>it yourselves! </a:t>
+            </a:r>
+            <a:r>
+              <a:rPr lang="en-US" baseline="0" dirty="0" smtClean="0"/>
+              <a:t>Before we close, does anyone have any questions?</a:t>
             </a:r>
             <a:endParaRPr lang="en-US" dirty="0"/>
           </a:p>
@@ -1309,15 +1313,7 @@
             </a:r>
             <a:r>
               <a:rPr lang="en-US" baseline="0" dirty="0" smtClean="0"/>
-              <a:t> about the requirements for this programming project, the first question that we asked ourselves was how can we make this application unique and different from all the others. We took a little bit of time, and found out that there are just a little over 1.4 million apps on the Play store! That is huge number, and it just keeps on getting bigger! Approximately about </a:t>
-            </a:r>
-            <a:r>
-              <a:rPr lang="en-US" baseline="0" dirty="0" smtClean="0"/>
-              <a:t>40 </a:t>
-            </a:r>
-            <a:r>
-              <a:rPr lang="en-US" baseline="0" dirty="0" smtClean="0"/>
-              <a:t>000 new apps are added to the app store monthly! (http://</a:t>
+              <a:t> about the requirements for this programming project, the first question that we asked ourselves was how can we make this application unique and different from all the others. We took a little bit of time, and found out that there are just a little over 1.4 million apps on the Play store! That is huge number, and it just keeps on getting bigger! Approximately about 40 000 new apps are added to the app store monthly! (http://</a:t>
             </a:r>
             <a:r>
               <a:rPr lang="en-US" baseline="0" dirty="0" err="1" smtClean="0"/>
@@ -1341,19 +1337,7 @@
             </a:r>
             <a:r>
               <a:rPr lang="en-US" baseline="0" dirty="0" smtClean="0"/>
-              <a:t> here </a:t>
-            </a:r>
-            <a:r>
-              <a:rPr lang="en-US" baseline="0" dirty="0" smtClean="0"/>
-              <a:t>came up with the fabulous idea about goats! Now, I know what you’re all thinking. How do goats fit into a question and answer app? And that my friends is where the beauty of this app lies. Let’s take a moment to think ourselves over to the Swiss Alps. Pristine snow, awesome skiing, and a very rich culture. Now, let’s think ourselves back to the app with a bit of a Swiss influence. Let’s say I want to ask a question. Too 1973, eh? Instead, I’ll </a:t>
-            </a:r>
-            <a:r>
-              <a:rPr lang="en-US" baseline="0" dirty="0" smtClean="0"/>
-              <a:t>Yodel </a:t>
-            </a:r>
-            <a:r>
-              <a:rPr lang="en-US" baseline="0" dirty="0" smtClean="0"/>
-              <a:t>it over. And my good friends on the </a:t>
+              <a:t> here came up with the fabulous idea about goats! Now, I know what you’re all thinking. How do goats fit into a question and answer app? And that my friends is where the beauty of this app lies. Let’s take a moment to think ourselves over to the Swiss Alps. Pristine snow, awesome skiing, and a very rich culture. Now, let’s think ourselves back to the app with a bit of a Swiss influence. Let’s say I want to ask a question. Too 1973, eh? Instead, I’ll Yodel it over. And my good friends on the </a:t>
             </a:r>
             <a:r>
               <a:rPr lang="en-US" baseline="0" dirty="0" err="1" smtClean="0"/>
@@ -1448,12 +1432,12 @@
           <a:lstStyle/>
           <a:p>
             <a:r>
-              <a:rPr lang="en-US" dirty="0" smtClean="0"/>
-              <a:t>Now, I just want to remind everyone that the</a:t>
+              <a:rPr lang="en-US" baseline="0" dirty="0" smtClean="0"/>
+              <a:t>On </a:t>
             </a:r>
             <a:r>
               <a:rPr lang="en-US" baseline="0" dirty="0" smtClean="0"/>
-              <a:t> app is still a work in progress, and that there will be quite a lot of differences between what you’re seeing right now, and what the final version will look like. But what we have developed right now is still a very good way to gauge the potential of the final product. On the screen right now is what it looks like for a user who is just about to open the </a:t>
+              <a:t>the screen right now is what it looks like for a user who is just about to open the </a:t>
             </a:r>
             <a:r>
               <a:rPr lang="en-US" baseline="0" dirty="0" err="1" smtClean="0"/>
@@ -1829,7 +1813,15 @@
             </a:r>
             <a:r>
               <a:rPr lang="en-US" baseline="0" dirty="0" smtClean="0"/>
-              <a:t> we were back at the main screen, if I had pressed, “Sing a Yodel” we would have been directed to this screen. Here, I can Yodel a question, and even attach a picture! The little box above the “Add Photo” button is just to give you a clue as to where an image that I’d add to my question would be. But for now, I’m just going to Yodel a simple question, but yet one that has had me confused for years. And I’m telling the truth here.</a:t>
+              <a:t> we were back at the main screen, if I had pressed, “Sing a Yodel” we would have been directed to this screen. Here, I can Yodel a question, and even attach a </a:t>
+            </a:r>
+            <a:r>
+              <a:rPr lang="en-US" baseline="0" smtClean="0"/>
+              <a:t>picture! </a:t>
+            </a:r>
+            <a:r>
+              <a:rPr lang="en-US" baseline="0" dirty="0" smtClean="0"/>
+              <a:t>But for now, I’m just going to Yodel a simple question, but yet one that has had me confused for years. And I’m telling the truth here.</a:t>
             </a:r>
             <a:endParaRPr lang="en-US" dirty="0"/>
           </a:p>
@@ -2292,7 +2284,7 @@
           <a:p>
             <a:fld id="{D9ED3922-3612-1C4B-96B2-634F7CE1C868}" type="datetimeFigureOut">
               <a:rPr lang="en-US" smtClean="0"/>
-              <a:t>14-11-23</a:t>
+              <a:t>14-12-01</a:t>
             </a:fld>
             <a:endParaRPr lang="en-US"/>
           </a:p>
@@ -2462,7 +2454,7 @@
           <a:p>
             <a:fld id="{D9ED3922-3612-1C4B-96B2-634F7CE1C868}" type="datetimeFigureOut">
               <a:rPr lang="en-US" smtClean="0"/>
-              <a:t>14-11-23</a:t>
+              <a:t>14-12-01</a:t>
             </a:fld>
             <a:endParaRPr lang="en-US"/>
           </a:p>
@@ -2642,7 +2634,7 @@
           <a:p>
             <a:fld id="{D9ED3922-3612-1C4B-96B2-634F7CE1C868}" type="datetimeFigureOut">
               <a:rPr lang="en-US" smtClean="0"/>
-              <a:t>14-11-23</a:t>
+              <a:t>14-12-01</a:t>
             </a:fld>
             <a:endParaRPr lang="en-US"/>
           </a:p>
@@ -2812,7 +2804,7 @@
           <a:p>
             <a:fld id="{D9ED3922-3612-1C4B-96B2-634F7CE1C868}" type="datetimeFigureOut">
               <a:rPr lang="en-US" smtClean="0"/>
-              <a:t>14-11-23</a:t>
+              <a:t>14-12-01</a:t>
             </a:fld>
             <a:endParaRPr lang="en-US"/>
           </a:p>
@@ -3058,7 +3050,7 @@
           <a:p>
             <a:fld id="{D9ED3922-3612-1C4B-96B2-634F7CE1C868}" type="datetimeFigureOut">
               <a:rPr lang="en-US" smtClean="0"/>
-              <a:t>14-11-23</a:t>
+              <a:t>14-12-01</a:t>
             </a:fld>
             <a:endParaRPr lang="en-US"/>
           </a:p>
@@ -3346,7 +3338,7 @@
           <a:p>
             <a:fld id="{D9ED3922-3612-1C4B-96B2-634F7CE1C868}" type="datetimeFigureOut">
               <a:rPr lang="en-US" smtClean="0"/>
-              <a:t>14-11-23</a:t>
+              <a:t>14-12-01</a:t>
             </a:fld>
             <a:endParaRPr lang="en-US"/>
           </a:p>
@@ -3768,7 +3760,7 @@
           <a:p>
             <a:fld id="{D9ED3922-3612-1C4B-96B2-634F7CE1C868}" type="datetimeFigureOut">
               <a:rPr lang="en-US" smtClean="0"/>
-              <a:t>14-11-23</a:t>
+              <a:t>14-12-01</a:t>
             </a:fld>
             <a:endParaRPr lang="en-US"/>
           </a:p>
@@ -3886,7 +3878,7 @@
           <a:p>
             <a:fld id="{D9ED3922-3612-1C4B-96B2-634F7CE1C868}" type="datetimeFigureOut">
               <a:rPr lang="en-US" smtClean="0"/>
-              <a:t>14-11-23</a:t>
+              <a:t>14-12-01</a:t>
             </a:fld>
             <a:endParaRPr lang="en-US"/>
           </a:p>
@@ -3981,7 +3973,7 @@
           <a:p>
             <a:fld id="{D9ED3922-3612-1C4B-96B2-634F7CE1C868}" type="datetimeFigureOut">
               <a:rPr lang="en-US" smtClean="0"/>
-              <a:t>14-11-23</a:t>
+              <a:t>14-12-01</a:t>
             </a:fld>
             <a:endParaRPr lang="en-US"/>
           </a:p>
@@ -4258,7 +4250,7 @@
           <a:p>
             <a:fld id="{D9ED3922-3612-1C4B-96B2-634F7CE1C868}" type="datetimeFigureOut">
               <a:rPr lang="en-US" smtClean="0"/>
-              <a:t>14-11-23</a:t>
+              <a:t>14-12-01</a:t>
             </a:fld>
             <a:endParaRPr lang="en-US"/>
           </a:p>
@@ -4511,7 +4503,7 @@
           <a:p>
             <a:fld id="{D9ED3922-3612-1C4B-96B2-634F7CE1C868}" type="datetimeFigureOut">
               <a:rPr lang="en-US" smtClean="0"/>
-              <a:t>14-11-23</a:t>
+              <a:t>14-12-01</a:t>
             </a:fld>
             <a:endParaRPr lang="en-US"/>
           </a:p>
@@ -4724,7 +4716,7 @@
           <a:p>
             <a:fld id="{D9ED3922-3612-1C4B-96B2-634F7CE1C868}" type="datetimeFigureOut">
               <a:rPr lang="en-US" smtClean="0"/>
-              <a:t>14-11-23</a:t>
+              <a:t>14-12-01</a:t>
             </a:fld>
             <a:endParaRPr lang="en-US"/>
           </a:p>
@@ -14120,7 +14112,7 @@
       </p:grpSp>
       <p:pic>
         <p:nvPicPr>
-          <p:cNvPr id="36" name="Content Placeholder 35" descr="(8) Click On Yodel.png"/>
+          <p:cNvPr id="13" name="Content Placeholder 12" descr="Screenshot_2014-12-01-02-10-47.png"/>
           <p:cNvPicPr>
             <a:picLocks noGrp="1" noChangeAspect="1"/>
           </p:cNvPicPr>
@@ -16718,7 +16710,7 @@
       </p:grpSp>
       <p:pic>
         <p:nvPicPr>
-          <p:cNvPr id="14" name="Content Placeholder 13" descr="(10) Echo Response.png"/>
+          <p:cNvPr id="13" name="Content Placeholder 12" descr="Screenshot_2014-12-01-02-11-36.png"/>
           <p:cNvPicPr>
             <a:picLocks noGrp="1" noChangeAspect="1"/>
           </p:cNvPicPr>
@@ -18022,7 +18014,7 @@
       </p:grpSp>
       <p:pic>
         <p:nvPicPr>
-          <p:cNvPr id="13" name="Content Placeholder 12" descr="(11) Echoed.png"/>
+          <p:cNvPr id="14" name="Content Placeholder 13" descr="Screenshot_2014-12-01-02-11-51.png"/>
           <p:cNvPicPr>
             <a:picLocks noGrp="1" noChangeAspect="1"/>
           </p:cNvPicPr>
@@ -29827,7 +29819,7 @@
       </p:grpSp>
       <p:pic>
         <p:nvPicPr>
-          <p:cNvPr id="13" name="Content Placeholder 12" descr="(5) Yodel A Question.png"/>
+          <p:cNvPr id="13" name="Content Placeholder 12" descr="Screenshot_2014-12-01-02-08-06.png"/>
           <p:cNvPicPr>
             <a:picLocks noGrp="1" noChangeAspect="1"/>
           </p:cNvPicPr>
@@ -31126,7 +31118,7 @@
       </p:grpSp>
       <p:pic>
         <p:nvPicPr>
-          <p:cNvPr id="13" name="Content Placeholder 12" descr="(6) Writing A Question.png"/>
+          <p:cNvPr id="14" name="Content Placeholder 13" descr="Screenshot_2014-12-01-02-10-19.png"/>
           <p:cNvPicPr>
             <a:picLocks noGrp="1" noChangeAspect="1"/>
           </p:cNvPicPr>

</xml_diff>